<commit_message>
Minor changes to the presentation and documentation.
</commit_message>
<xml_diff>
--- a/docs/final_documentation/Präsi_vonAlexgeändert.pptx
+++ b/docs/final_documentation/Präsi_vonAlexgeändert.pptx
@@ -5,10 +5,10 @@
     <p:sldMasterId id="2147483649" r:id="rId1"/>
   </p:sldMasterIdLst>
   <p:notesMasterIdLst>
-    <p:notesMasterId r:id="rId20"/>
+    <p:notesMasterId r:id="rId21"/>
   </p:notesMasterIdLst>
   <p:handoutMasterIdLst>
-    <p:handoutMasterId r:id="rId21"/>
+    <p:handoutMasterId r:id="rId22"/>
   </p:handoutMasterIdLst>
   <p:sldIdLst>
     <p:sldId id="350" r:id="rId2"/>
@@ -19,16 +19,17 @@
     <p:sldId id="348" r:id="rId7"/>
     <p:sldId id="351" r:id="rId8"/>
     <p:sldId id="352" r:id="rId9"/>
-    <p:sldId id="349" r:id="rId10"/>
-    <p:sldId id="337" r:id="rId11"/>
-    <p:sldId id="334" r:id="rId12"/>
-    <p:sldId id="336" r:id="rId13"/>
-    <p:sldId id="339" r:id="rId14"/>
-    <p:sldId id="341" r:id="rId15"/>
-    <p:sldId id="342" r:id="rId16"/>
-    <p:sldId id="343" r:id="rId17"/>
-    <p:sldId id="344" r:id="rId18"/>
-    <p:sldId id="345" r:id="rId19"/>
+    <p:sldId id="354" r:id="rId10"/>
+    <p:sldId id="349" r:id="rId11"/>
+    <p:sldId id="337" r:id="rId12"/>
+    <p:sldId id="334" r:id="rId13"/>
+    <p:sldId id="336" r:id="rId14"/>
+    <p:sldId id="339" r:id="rId15"/>
+    <p:sldId id="341" r:id="rId16"/>
+    <p:sldId id="342" r:id="rId17"/>
+    <p:sldId id="343" r:id="rId18"/>
+    <p:sldId id="344" r:id="rId19"/>
+    <p:sldId id="345" r:id="rId20"/>
   </p:sldIdLst>
   <p:sldSz cx="9144000" cy="6858000" type="screen4x3"/>
   <p:notesSz cx="6858000" cy="9144000"/>
@@ -3126,6 +3127,95 @@
 </p:notes>
 </file>
 
+<file path=ppt/notesSlides/notesSlide5.xml><?xml version="1.0" encoding="utf-8"?>
+<p:notes xmlns:a="http://schemas.openxmlformats.org/drawingml/2006/main" xmlns:r="http://schemas.openxmlformats.org/officeDocument/2006/relationships" xmlns:p="http://schemas.openxmlformats.org/presentationml/2006/main">
+  <p:cSld>
+    <p:spTree>
+      <p:nvGrpSpPr>
+        <p:cNvPr id="1" name=""/>
+        <p:cNvGrpSpPr/>
+        <p:nvPr/>
+      </p:nvGrpSpPr>
+      <p:grpSpPr>
+        <a:xfrm>
+          <a:off x="0" y="0"/>
+          <a:ext cx="0" cy="0"/>
+          <a:chOff x="0" y="0"/>
+          <a:chExt cx="0" cy="0"/>
+        </a:xfrm>
+      </p:grpSpPr>
+      <p:sp>
+        <p:nvSpPr>
+          <p:cNvPr id="2" name="Folienbildplatzhalter 1"/>
+          <p:cNvSpPr>
+            <a:spLocks noGrp="1" noRot="1" noChangeAspect="1"/>
+          </p:cNvSpPr>
+          <p:nvPr>
+            <p:ph type="sldImg"/>
+          </p:nvPr>
+        </p:nvSpPr>
+        <p:spPr/>
+      </p:sp>
+      <p:sp>
+        <p:nvSpPr>
+          <p:cNvPr id="3" name="Notizenplatzhalter 2"/>
+          <p:cNvSpPr>
+            <a:spLocks noGrp="1"/>
+          </p:cNvSpPr>
+          <p:nvPr>
+            <p:ph type="body" idx="1"/>
+          </p:nvPr>
+        </p:nvSpPr>
+        <p:spPr/>
+        <p:txBody>
+          <a:bodyPr/>
+          <a:lstStyle/>
+          <a:p>
+            <a:pPr marL="171450" lvl="0" indent="-171450">
+              <a:buFont typeface="Arial" panose="020B0604020202020204" pitchFamily="34" charset="0"/>
+              <a:buChar char="•"/>
+            </a:pPr>
+            <a:endParaRPr lang="de-DE" dirty="0"/>
+          </a:p>
+        </p:txBody>
+      </p:sp>
+      <p:sp>
+        <p:nvSpPr>
+          <p:cNvPr id="4" name="Foliennummernplatzhalter 3"/>
+          <p:cNvSpPr>
+            <a:spLocks noGrp="1"/>
+          </p:cNvSpPr>
+          <p:nvPr>
+            <p:ph type="sldNum" sz="quarter" idx="10"/>
+          </p:nvPr>
+        </p:nvSpPr>
+        <p:spPr/>
+        <p:txBody>
+          <a:bodyPr/>
+          <a:lstStyle/>
+          <a:p>
+            <a:fld id="{1760A340-2167-4270-89CF-50EB6C0DB420}" type="slidenum">
+              <a:rPr lang="de-DE" altLang="de-DE" smtClean="0"/>
+              <a:pPr/>
+              <a:t>9</a:t>
+            </a:fld>
+            <a:endParaRPr lang="de-DE" altLang="de-DE"/>
+          </a:p>
+        </p:txBody>
+      </p:sp>
+    </p:spTree>
+    <p:extLst>
+      <p:ext uri="{BB962C8B-B14F-4D97-AF65-F5344CB8AC3E}">
+        <p14:creationId xmlns:p14="http://schemas.microsoft.com/office/powerpoint/2010/main" val="52241874"/>
+      </p:ext>
+    </p:extLst>
+  </p:cSld>
+  <p:clrMapOvr>
+    <a:masterClrMapping/>
+  </p:clrMapOvr>
+</p:notes>
+</file>
+
 <file path=ppt/slideLayouts/slideLayout1.xml><?xml version="1.0" encoding="utf-8"?>
 <p:sldLayout xmlns:a="http://schemas.openxmlformats.org/drawingml/2006/main" xmlns:r="http://schemas.openxmlformats.org/officeDocument/2006/relationships" xmlns:p="http://schemas.openxmlformats.org/presentationml/2006/main" showMasterSp="0" type="title" preserve="1">
   <p:cSld name="Titelfolie">
@@ -4684,6 +4774,342 @@
           <a:bodyPr/>
           <a:lstStyle/>
           <a:p>
+            <a:r>
+              <a:rPr lang="de-DE" altLang="de-DE" dirty="0"/>
+              <a:t>5. Ausblick</a:t>
+            </a:r>
+          </a:p>
+        </p:txBody>
+      </p:sp>
+      <p:sp>
+        <p:nvSpPr>
+          <p:cNvPr id="6" name="Rectangle 3"/>
+          <p:cNvSpPr txBox="1">
+            <a:spLocks noChangeArrowheads="1"/>
+          </p:cNvSpPr>
+          <p:nvPr/>
+        </p:nvSpPr>
+        <p:spPr>
+          <a:xfrm>
+            <a:off x="971550" y="2160000"/>
+            <a:ext cx="7677150" cy="3600450"/>
+          </a:xfrm>
+          <a:prstGeom prst="rect">
+            <a:avLst/>
+          </a:prstGeom>
+        </p:spPr>
+        <p:txBody>
+          <a:bodyPr/>
+          <a:lstStyle>
+            <a:lvl1pPr algn="l" rtl="0" eaLnBrk="1" fontAlgn="base" hangingPunct="1">
+              <a:lnSpc>
+                <a:spcPct val="110000"/>
+              </a:lnSpc>
+              <a:spcBef>
+                <a:spcPct val="0"/>
+              </a:spcBef>
+              <a:spcAft>
+                <a:spcPct val="20000"/>
+              </a:spcAft>
+              <a:defRPr>
+                <a:solidFill>
+                  <a:schemeClr val="tx1"/>
+                </a:solidFill>
+                <a:latin typeface="+mn-lt"/>
+                <a:ea typeface="+mn-ea"/>
+                <a:cs typeface="+mn-cs"/>
+              </a:defRPr>
+            </a:lvl1pPr>
+            <a:lvl2pPr marL="182563" indent="-180975" algn="l" rtl="0" eaLnBrk="1" fontAlgn="base" hangingPunct="1">
+              <a:lnSpc>
+                <a:spcPct val="110000"/>
+              </a:lnSpc>
+              <a:spcBef>
+                <a:spcPct val="0"/>
+              </a:spcBef>
+              <a:spcAft>
+                <a:spcPct val="20000"/>
+              </a:spcAft>
+              <a:buFont typeface="Arial" charset="0"/>
+              <a:buChar char="•"/>
+              <a:defRPr>
+                <a:solidFill>
+                  <a:schemeClr val="tx1"/>
+                </a:solidFill>
+                <a:latin typeface="+mn-lt"/>
+              </a:defRPr>
+            </a:lvl2pPr>
+            <a:lvl3pPr marL="366713" indent="-182563" algn="l" rtl="0" eaLnBrk="1" fontAlgn="base" hangingPunct="1">
+              <a:lnSpc>
+                <a:spcPct val="110000"/>
+              </a:lnSpc>
+              <a:spcBef>
+                <a:spcPct val="0"/>
+              </a:spcBef>
+              <a:spcAft>
+                <a:spcPct val="20000"/>
+              </a:spcAft>
+              <a:buFont typeface="Arial" charset="0"/>
+              <a:buChar char="•"/>
+              <a:defRPr>
+                <a:solidFill>
+                  <a:schemeClr val="tx1"/>
+                </a:solidFill>
+                <a:latin typeface="+mn-lt"/>
+              </a:defRPr>
+            </a:lvl3pPr>
+            <a:lvl4pPr marL="552450" indent="-184150" algn="l" rtl="0" eaLnBrk="1" fontAlgn="base" hangingPunct="1">
+              <a:lnSpc>
+                <a:spcPct val="110000"/>
+              </a:lnSpc>
+              <a:spcBef>
+                <a:spcPct val="0"/>
+              </a:spcBef>
+              <a:spcAft>
+                <a:spcPct val="20000"/>
+              </a:spcAft>
+              <a:buFont typeface="Arial" charset="0"/>
+              <a:buChar char="•"/>
+              <a:defRPr>
+                <a:solidFill>
+                  <a:schemeClr val="tx1"/>
+                </a:solidFill>
+                <a:latin typeface="+mn-lt"/>
+              </a:defRPr>
+            </a:lvl4pPr>
+            <a:lvl5pPr marL="738188" indent="-184150" algn="l" rtl="0" eaLnBrk="1" fontAlgn="base" hangingPunct="1">
+              <a:lnSpc>
+                <a:spcPct val="110000"/>
+              </a:lnSpc>
+              <a:spcBef>
+                <a:spcPct val="0"/>
+              </a:spcBef>
+              <a:spcAft>
+                <a:spcPct val="20000"/>
+              </a:spcAft>
+              <a:buFont typeface="Arial" charset="0"/>
+              <a:buChar char="•"/>
+              <a:defRPr>
+                <a:solidFill>
+                  <a:schemeClr val="tx1"/>
+                </a:solidFill>
+                <a:latin typeface="+mn-lt"/>
+              </a:defRPr>
+            </a:lvl5pPr>
+            <a:lvl6pPr marL="1195388" indent="-184150" algn="l" rtl="0" eaLnBrk="1" fontAlgn="base" hangingPunct="1">
+              <a:lnSpc>
+                <a:spcPct val="110000"/>
+              </a:lnSpc>
+              <a:spcBef>
+                <a:spcPct val="0"/>
+              </a:spcBef>
+              <a:spcAft>
+                <a:spcPct val="20000"/>
+              </a:spcAft>
+              <a:buFont typeface="Arial" charset="0"/>
+              <a:buChar char="•"/>
+              <a:defRPr>
+                <a:solidFill>
+                  <a:schemeClr val="tx1"/>
+                </a:solidFill>
+                <a:latin typeface="+mn-lt"/>
+              </a:defRPr>
+            </a:lvl6pPr>
+            <a:lvl7pPr marL="1652588" indent="-184150" algn="l" rtl="0" eaLnBrk="1" fontAlgn="base" hangingPunct="1">
+              <a:lnSpc>
+                <a:spcPct val="110000"/>
+              </a:lnSpc>
+              <a:spcBef>
+                <a:spcPct val="0"/>
+              </a:spcBef>
+              <a:spcAft>
+                <a:spcPct val="20000"/>
+              </a:spcAft>
+              <a:buFont typeface="Arial" charset="0"/>
+              <a:buChar char="•"/>
+              <a:defRPr>
+                <a:solidFill>
+                  <a:schemeClr val="tx1"/>
+                </a:solidFill>
+                <a:latin typeface="+mn-lt"/>
+              </a:defRPr>
+            </a:lvl7pPr>
+            <a:lvl8pPr marL="2109788" indent="-184150" algn="l" rtl="0" eaLnBrk="1" fontAlgn="base" hangingPunct="1">
+              <a:lnSpc>
+                <a:spcPct val="110000"/>
+              </a:lnSpc>
+              <a:spcBef>
+                <a:spcPct val="0"/>
+              </a:spcBef>
+              <a:spcAft>
+                <a:spcPct val="20000"/>
+              </a:spcAft>
+              <a:buFont typeface="Arial" charset="0"/>
+              <a:buChar char="•"/>
+              <a:defRPr>
+                <a:solidFill>
+                  <a:schemeClr val="tx1"/>
+                </a:solidFill>
+                <a:latin typeface="+mn-lt"/>
+              </a:defRPr>
+            </a:lvl8pPr>
+            <a:lvl9pPr marL="2566988" indent="-184150" algn="l" rtl="0" eaLnBrk="1" fontAlgn="base" hangingPunct="1">
+              <a:lnSpc>
+                <a:spcPct val="110000"/>
+              </a:lnSpc>
+              <a:spcBef>
+                <a:spcPct val="0"/>
+              </a:spcBef>
+              <a:spcAft>
+                <a:spcPct val="20000"/>
+              </a:spcAft>
+              <a:buFont typeface="Arial" charset="0"/>
+              <a:buChar char="•"/>
+              <a:defRPr>
+                <a:solidFill>
+                  <a:schemeClr val="tx1"/>
+                </a:solidFill>
+                <a:latin typeface="+mn-lt"/>
+              </a:defRPr>
+            </a:lvl9pPr>
+          </a:lstStyle>
+          <a:p>
+            <a:pPr lvl="1"/>
+            <a:r>
+              <a:rPr lang="en-US" altLang="de-DE" kern="0" dirty="0"/>
+              <a:t>Finetuning der Parameter</a:t>
+            </a:r>
+            <a:endParaRPr lang="de-DE" altLang="de-DE" kern="0" dirty="0"/>
+          </a:p>
+          <a:p>
+            <a:pPr lvl="1"/>
+            <a:r>
+              <a:rPr lang="de-DE" altLang="de-DE" kern="0" dirty="0"/>
+              <a:t>Erstellung von C++ Code</a:t>
+            </a:r>
+          </a:p>
+          <a:p>
+            <a:pPr lvl="1"/>
+            <a:r>
+              <a:rPr lang="de-DE" altLang="de-DE" kern="0" dirty="0"/>
+              <a:t>Kompilierung </a:t>
+            </a:r>
+          </a:p>
+          <a:p>
+            <a:pPr lvl="1"/>
+            <a:r>
+              <a:rPr lang="de-DE" altLang="de-DE" kern="0" dirty="0"/>
+              <a:t>Fertigstellung des Android Moduls</a:t>
+            </a:r>
+          </a:p>
+          <a:p>
+            <a:pPr lvl="1"/>
+            <a:endParaRPr lang="de-DE" altLang="de-DE" kern="0" dirty="0"/>
+          </a:p>
+          <a:p>
+            <a:pPr lvl="1"/>
+            <a:endParaRPr lang="de-DE" altLang="de-DE" kern="0" dirty="0"/>
+          </a:p>
+        </p:txBody>
+      </p:sp>
+      <p:sp>
+        <p:nvSpPr>
+          <p:cNvPr id="2" name="Fußzeilenplatzhalter 1"/>
+          <p:cNvSpPr>
+            <a:spLocks noGrp="1"/>
+          </p:cNvSpPr>
+          <p:nvPr>
+            <p:ph type="ftr" sz="quarter" idx="10"/>
+          </p:nvPr>
+        </p:nvSpPr>
+        <p:spPr/>
+        <p:txBody>
+          <a:bodyPr/>
+          <a:lstStyle/>
+          <a:p>
+            <a:r>
+              <a:rPr lang="en-US" altLang="de-DE"/>
+              <a:t>SIP2 Zwischenpräsentation | Uschakow | Alhanoun | Skiadas</a:t>
+            </a:r>
+            <a:endParaRPr lang="de-DE" altLang="de-DE" dirty="0"/>
+          </a:p>
+        </p:txBody>
+      </p:sp>
+      <p:sp>
+        <p:nvSpPr>
+          <p:cNvPr id="7" name="Foliennummernplatzhalter 6"/>
+          <p:cNvSpPr>
+            <a:spLocks noGrp="1"/>
+          </p:cNvSpPr>
+          <p:nvPr>
+            <p:ph type="sldNum" sz="quarter" idx="11"/>
+          </p:nvPr>
+        </p:nvSpPr>
+        <p:spPr/>
+        <p:txBody>
+          <a:bodyPr/>
+          <a:lstStyle/>
+          <a:p>
+            <a:fld id="{57D12BB6-0ED4-46B6-AB23-7758AD07EFBF}" type="slidenum">
+              <a:rPr lang="de-DE" smtClean="0"/>
+              <a:pPr/>
+              <a:t>10</a:t>
+            </a:fld>
+            <a:endParaRPr lang="de-DE" dirty="0"/>
+          </a:p>
+        </p:txBody>
+      </p:sp>
+    </p:spTree>
+    <p:extLst>
+      <p:ext uri="{BB962C8B-B14F-4D97-AF65-F5344CB8AC3E}">
+        <p14:creationId xmlns:p14="http://schemas.microsoft.com/office/powerpoint/2010/main" val="1080710209"/>
+      </p:ext>
+    </p:extLst>
+  </p:cSld>
+  <p:clrMapOvr>
+    <a:masterClrMapping/>
+  </p:clrMapOvr>
+  <p:transition/>
+</p:sld>
+</file>
+
+<file path=ppt/slides/slide11.xml><?xml version="1.0" encoding="utf-8"?>
+<p:sld xmlns:a="http://schemas.openxmlformats.org/drawingml/2006/main" xmlns:r="http://schemas.openxmlformats.org/officeDocument/2006/relationships" xmlns:p="http://schemas.openxmlformats.org/presentationml/2006/main">
+  <p:cSld>
+    <p:spTree>
+      <p:nvGrpSpPr>
+        <p:cNvPr id="1" name=""/>
+        <p:cNvGrpSpPr/>
+        <p:nvPr/>
+      </p:nvGrpSpPr>
+      <p:grpSpPr>
+        <a:xfrm>
+          <a:off x="0" y="0"/>
+          <a:ext cx="0" cy="0"/>
+          <a:chOff x="0" y="0"/>
+          <a:chExt cx="0" cy="0"/>
+        </a:xfrm>
+      </p:grpSpPr>
+      <p:sp>
+        <p:nvSpPr>
+          <p:cNvPr id="5" name="Rectangle 2"/>
+          <p:cNvSpPr>
+            <a:spLocks noGrp="1" noChangeArrowheads="1"/>
+          </p:cNvSpPr>
+          <p:nvPr>
+            <p:ph type="title"/>
+          </p:nvPr>
+        </p:nvSpPr>
+        <p:spPr>
+          <a:xfrm>
+            <a:off x="971550" y="1404000"/>
+            <a:ext cx="7704138" cy="792162"/>
+          </a:xfrm>
+        </p:spPr>
+        <p:txBody>
+          <a:bodyPr/>
+          <a:lstStyle/>
+          <a:p>
             <a:br>
               <a:rPr lang="de-DE" altLang="de-DE" dirty="0"/>
             </a:br>
@@ -4768,7 +5194,7 @@
             <a:fld id="{57D12BB6-0ED4-46B6-AB23-7758AD07EFBF}" type="slidenum">
               <a:rPr lang="de-DE" smtClean="0"/>
               <a:pPr/>
-              <a:t>10</a:t>
+              <a:t>11</a:t>
             </a:fld>
             <a:endParaRPr lang="de-DE" dirty="0"/>
           </a:p>
@@ -4778,919 +5204,6 @@
     <p:extLst>
       <p:ext uri="{BB962C8B-B14F-4D97-AF65-F5344CB8AC3E}">
         <p14:creationId xmlns:p14="http://schemas.microsoft.com/office/powerpoint/2010/main" val="422122669"/>
-      </p:ext>
-    </p:extLst>
-  </p:cSld>
-  <p:clrMapOvr>
-    <a:masterClrMapping/>
-  </p:clrMapOvr>
-  <p:transition/>
-</p:sld>
-</file>
-
-<file path=ppt/slides/slide11.xml><?xml version="1.0" encoding="utf-8"?>
-<p:sld xmlns:a="http://schemas.openxmlformats.org/drawingml/2006/main" xmlns:r="http://schemas.openxmlformats.org/officeDocument/2006/relationships" xmlns:p="http://schemas.openxmlformats.org/presentationml/2006/main">
-  <p:cSld>
-    <p:spTree>
-      <p:nvGrpSpPr>
-        <p:cNvPr id="1" name=""/>
-        <p:cNvGrpSpPr/>
-        <p:nvPr/>
-      </p:nvGrpSpPr>
-      <p:grpSpPr>
-        <a:xfrm>
-          <a:off x="0" y="0"/>
-          <a:ext cx="0" cy="0"/>
-          <a:chOff x="0" y="0"/>
-          <a:chExt cx="0" cy="0"/>
-        </a:xfrm>
-      </p:grpSpPr>
-      <p:sp>
-        <p:nvSpPr>
-          <p:cNvPr id="5" name="Rectangle 2"/>
-          <p:cNvSpPr>
-            <a:spLocks noGrp="1" noChangeArrowheads="1"/>
-          </p:cNvSpPr>
-          <p:nvPr>
-            <p:ph type="title"/>
-          </p:nvPr>
-        </p:nvSpPr>
-        <p:spPr>
-          <a:xfrm>
-            <a:off x="971550" y="1404000"/>
-            <a:ext cx="6984826" cy="792162"/>
-          </a:xfrm>
-        </p:spPr>
-        <p:txBody>
-          <a:bodyPr/>
-          <a:lstStyle/>
-          <a:p>
-            <a:r>
-              <a:rPr lang="de-DE" altLang="de-DE" dirty="0"/>
-              <a:t>Überschrift Bildfolie – zwei Bilder mit Text</a:t>
-            </a:r>
-          </a:p>
-        </p:txBody>
-      </p:sp>
-      <p:sp>
-        <p:nvSpPr>
-          <p:cNvPr id="6" name="Rectangle 3"/>
-          <p:cNvSpPr txBox="1">
-            <a:spLocks noChangeArrowheads="1"/>
-          </p:cNvSpPr>
-          <p:nvPr/>
-        </p:nvSpPr>
-        <p:spPr>
-          <a:xfrm>
-            <a:off x="971550" y="5373688"/>
-            <a:ext cx="3744913" cy="863600"/>
-          </a:xfrm>
-          <a:prstGeom prst="rect">
-            <a:avLst/>
-          </a:prstGeom>
-        </p:spPr>
-        <p:txBody>
-          <a:bodyPr/>
-          <a:lstStyle>
-            <a:lvl1pPr algn="l" rtl="0" eaLnBrk="1" fontAlgn="base" hangingPunct="1">
-              <a:lnSpc>
-                <a:spcPct val="110000"/>
-              </a:lnSpc>
-              <a:spcBef>
-                <a:spcPct val="0"/>
-              </a:spcBef>
-              <a:spcAft>
-                <a:spcPct val="20000"/>
-              </a:spcAft>
-              <a:defRPr>
-                <a:solidFill>
-                  <a:schemeClr val="tx1"/>
-                </a:solidFill>
-                <a:latin typeface="+mn-lt"/>
-                <a:ea typeface="+mn-ea"/>
-                <a:cs typeface="+mn-cs"/>
-              </a:defRPr>
-            </a:lvl1pPr>
-            <a:lvl2pPr marL="182563" indent="-180975" algn="l" rtl="0" eaLnBrk="1" fontAlgn="base" hangingPunct="1">
-              <a:lnSpc>
-                <a:spcPct val="110000"/>
-              </a:lnSpc>
-              <a:spcBef>
-                <a:spcPct val="0"/>
-              </a:spcBef>
-              <a:spcAft>
-                <a:spcPct val="20000"/>
-              </a:spcAft>
-              <a:buFont typeface="Arial" charset="0"/>
-              <a:buChar char="•"/>
-              <a:defRPr>
-                <a:solidFill>
-                  <a:schemeClr val="tx1"/>
-                </a:solidFill>
-                <a:latin typeface="+mn-lt"/>
-              </a:defRPr>
-            </a:lvl2pPr>
-            <a:lvl3pPr marL="366713" indent="-182563" algn="l" rtl="0" eaLnBrk="1" fontAlgn="base" hangingPunct="1">
-              <a:lnSpc>
-                <a:spcPct val="110000"/>
-              </a:lnSpc>
-              <a:spcBef>
-                <a:spcPct val="0"/>
-              </a:spcBef>
-              <a:spcAft>
-                <a:spcPct val="20000"/>
-              </a:spcAft>
-              <a:buFont typeface="Arial" charset="0"/>
-              <a:buChar char="•"/>
-              <a:defRPr>
-                <a:solidFill>
-                  <a:schemeClr val="tx1"/>
-                </a:solidFill>
-                <a:latin typeface="+mn-lt"/>
-              </a:defRPr>
-            </a:lvl3pPr>
-            <a:lvl4pPr marL="552450" indent="-184150" algn="l" rtl="0" eaLnBrk="1" fontAlgn="base" hangingPunct="1">
-              <a:lnSpc>
-                <a:spcPct val="110000"/>
-              </a:lnSpc>
-              <a:spcBef>
-                <a:spcPct val="0"/>
-              </a:spcBef>
-              <a:spcAft>
-                <a:spcPct val="20000"/>
-              </a:spcAft>
-              <a:buFont typeface="Arial" charset="0"/>
-              <a:buChar char="•"/>
-              <a:defRPr>
-                <a:solidFill>
-                  <a:schemeClr val="tx1"/>
-                </a:solidFill>
-                <a:latin typeface="+mn-lt"/>
-              </a:defRPr>
-            </a:lvl4pPr>
-            <a:lvl5pPr marL="738188" indent="-184150" algn="l" rtl="0" eaLnBrk="1" fontAlgn="base" hangingPunct="1">
-              <a:lnSpc>
-                <a:spcPct val="110000"/>
-              </a:lnSpc>
-              <a:spcBef>
-                <a:spcPct val="0"/>
-              </a:spcBef>
-              <a:spcAft>
-                <a:spcPct val="20000"/>
-              </a:spcAft>
-              <a:buFont typeface="Arial" charset="0"/>
-              <a:buChar char="•"/>
-              <a:defRPr>
-                <a:solidFill>
-                  <a:schemeClr val="tx1"/>
-                </a:solidFill>
-                <a:latin typeface="+mn-lt"/>
-              </a:defRPr>
-            </a:lvl5pPr>
-            <a:lvl6pPr marL="1195388" indent="-184150" algn="l" rtl="0" eaLnBrk="1" fontAlgn="base" hangingPunct="1">
-              <a:lnSpc>
-                <a:spcPct val="110000"/>
-              </a:lnSpc>
-              <a:spcBef>
-                <a:spcPct val="0"/>
-              </a:spcBef>
-              <a:spcAft>
-                <a:spcPct val="20000"/>
-              </a:spcAft>
-              <a:buFont typeface="Arial" charset="0"/>
-              <a:buChar char="•"/>
-              <a:defRPr>
-                <a:solidFill>
-                  <a:schemeClr val="tx1"/>
-                </a:solidFill>
-                <a:latin typeface="+mn-lt"/>
-              </a:defRPr>
-            </a:lvl6pPr>
-            <a:lvl7pPr marL="1652588" indent="-184150" algn="l" rtl="0" eaLnBrk="1" fontAlgn="base" hangingPunct="1">
-              <a:lnSpc>
-                <a:spcPct val="110000"/>
-              </a:lnSpc>
-              <a:spcBef>
-                <a:spcPct val="0"/>
-              </a:spcBef>
-              <a:spcAft>
-                <a:spcPct val="20000"/>
-              </a:spcAft>
-              <a:buFont typeface="Arial" charset="0"/>
-              <a:buChar char="•"/>
-              <a:defRPr>
-                <a:solidFill>
-                  <a:schemeClr val="tx1"/>
-                </a:solidFill>
-                <a:latin typeface="+mn-lt"/>
-              </a:defRPr>
-            </a:lvl7pPr>
-            <a:lvl8pPr marL="2109788" indent="-184150" algn="l" rtl="0" eaLnBrk="1" fontAlgn="base" hangingPunct="1">
-              <a:lnSpc>
-                <a:spcPct val="110000"/>
-              </a:lnSpc>
-              <a:spcBef>
-                <a:spcPct val="0"/>
-              </a:spcBef>
-              <a:spcAft>
-                <a:spcPct val="20000"/>
-              </a:spcAft>
-              <a:buFont typeface="Arial" charset="0"/>
-              <a:buChar char="•"/>
-              <a:defRPr>
-                <a:solidFill>
-                  <a:schemeClr val="tx1"/>
-                </a:solidFill>
-                <a:latin typeface="+mn-lt"/>
-              </a:defRPr>
-            </a:lvl8pPr>
-            <a:lvl9pPr marL="2566988" indent="-184150" algn="l" rtl="0" eaLnBrk="1" fontAlgn="base" hangingPunct="1">
-              <a:lnSpc>
-                <a:spcPct val="110000"/>
-              </a:lnSpc>
-              <a:spcBef>
-                <a:spcPct val="0"/>
-              </a:spcBef>
-              <a:spcAft>
-                <a:spcPct val="20000"/>
-              </a:spcAft>
-              <a:buFont typeface="Arial" charset="0"/>
-              <a:buChar char="•"/>
-              <a:defRPr>
-                <a:solidFill>
-                  <a:schemeClr val="tx1"/>
-                </a:solidFill>
-                <a:latin typeface="+mn-lt"/>
-              </a:defRPr>
-            </a:lvl9pPr>
-          </a:lstStyle>
-          <a:p>
-            <a:r>
-              <a:rPr lang="de-DE" altLang="de-DE" sz="1500" kern="0"/>
-              <a:t>Mit seiner Aufnahme in die Elite war Knechts Leben auf eine andre Ebene verpflanzt.</a:t>
-            </a:r>
-          </a:p>
-        </p:txBody>
-      </p:sp>
-      <p:sp>
-        <p:nvSpPr>
-          <p:cNvPr id="7" name="Rectangle 4"/>
-          <p:cNvSpPr>
-            <a:spLocks noChangeArrowheads="1"/>
-          </p:cNvSpPr>
-          <p:nvPr/>
-        </p:nvSpPr>
-        <p:spPr bwMode="invGray">
-          <a:xfrm>
-            <a:off x="971550" y="2060848"/>
-            <a:ext cx="3744913" cy="3096940"/>
-          </a:xfrm>
-          <a:prstGeom prst="rect">
-            <a:avLst/>
-          </a:prstGeom>
-          <a:solidFill>
-            <a:srgbClr val="C0C0C0"/>
-          </a:solidFill>
-          <a:ln>
-            <a:noFill/>
-          </a:ln>
-          <a:effectLst/>
-          <a:extLst>
-            <a:ext uri="{91240B29-F687-4F45-9708-019B960494DF}">
-              <a14:hiddenLine xmlns:a14="http://schemas.microsoft.com/office/drawing/2010/main" w="19050" algn="ctr">
-                <a:solidFill>
-                  <a:schemeClr val="tx2"/>
-                </a:solidFill>
-                <a:miter lim="800000"/>
-                <a:headEnd/>
-                <a:tailEnd/>
-              </a14:hiddenLine>
-            </a:ext>
-            <a:ext uri="{AF507438-7753-43E0-B8FC-AC1667EBCBE1}">
-              <a14:hiddenEffects xmlns:a14="http://schemas.microsoft.com/office/drawing/2010/main">
-                <a:effectLst>
-                  <a:outerShdw dist="35921" dir="2700000" algn="ctr" rotWithShape="0">
-                    <a:schemeClr val="bg2"/>
-                  </a:outerShdw>
-                </a:effectLst>
-              </a14:hiddenEffects>
-            </a:ext>
-          </a:extLst>
-        </p:spPr>
-        <p:txBody>
-          <a:bodyPr lIns="0" tIns="0" rIns="0" bIns="0" anchor="ctr"/>
-          <a:lstStyle>
-            <a:lvl1pPr marL="376238" algn="l">
-              <a:defRPr sz="2400">
-                <a:solidFill>
-                  <a:schemeClr val="tx1"/>
-                </a:solidFill>
-                <a:latin typeface="Arial" charset="0"/>
-              </a:defRPr>
-            </a:lvl1pPr>
-            <a:lvl2pPr marL="566738" algn="l">
-              <a:defRPr sz="2400">
-                <a:solidFill>
-                  <a:schemeClr val="tx1"/>
-                </a:solidFill>
-                <a:latin typeface="Arial" charset="0"/>
-              </a:defRPr>
-            </a:lvl2pPr>
-            <a:lvl3pPr algn="l">
-              <a:defRPr sz="2400">
-                <a:solidFill>
-                  <a:schemeClr val="tx1"/>
-                </a:solidFill>
-                <a:latin typeface="Arial" charset="0"/>
-              </a:defRPr>
-            </a:lvl3pPr>
-            <a:lvl4pPr algn="l">
-              <a:defRPr sz="2400">
-                <a:solidFill>
-                  <a:schemeClr val="tx1"/>
-                </a:solidFill>
-                <a:latin typeface="Arial" charset="0"/>
-              </a:defRPr>
-            </a:lvl4pPr>
-            <a:lvl5pPr algn="l">
-              <a:defRPr sz="2400">
-                <a:solidFill>
-                  <a:schemeClr val="tx1"/>
-                </a:solidFill>
-                <a:latin typeface="Arial" charset="0"/>
-              </a:defRPr>
-            </a:lvl5pPr>
-            <a:lvl6pPr eaLnBrk="0" fontAlgn="base" hangingPunct="0">
-              <a:spcBef>
-                <a:spcPct val="0"/>
-              </a:spcBef>
-              <a:spcAft>
-                <a:spcPct val="0"/>
-              </a:spcAft>
-              <a:defRPr sz="2400">
-                <a:solidFill>
-                  <a:schemeClr val="tx1"/>
-                </a:solidFill>
-                <a:latin typeface="Arial" charset="0"/>
-              </a:defRPr>
-            </a:lvl6pPr>
-            <a:lvl7pPr eaLnBrk="0" fontAlgn="base" hangingPunct="0">
-              <a:spcBef>
-                <a:spcPct val="0"/>
-              </a:spcBef>
-              <a:spcAft>
-                <a:spcPct val="0"/>
-              </a:spcAft>
-              <a:defRPr sz="2400">
-                <a:solidFill>
-                  <a:schemeClr val="tx1"/>
-                </a:solidFill>
-                <a:latin typeface="Arial" charset="0"/>
-              </a:defRPr>
-            </a:lvl7pPr>
-            <a:lvl8pPr eaLnBrk="0" fontAlgn="base" hangingPunct="0">
-              <a:spcBef>
-                <a:spcPct val="0"/>
-              </a:spcBef>
-              <a:spcAft>
-                <a:spcPct val="0"/>
-              </a:spcAft>
-              <a:defRPr sz="2400">
-                <a:solidFill>
-                  <a:schemeClr val="tx1"/>
-                </a:solidFill>
-                <a:latin typeface="Arial" charset="0"/>
-              </a:defRPr>
-            </a:lvl8pPr>
-            <a:lvl9pPr eaLnBrk="0" fontAlgn="base" hangingPunct="0">
-              <a:spcBef>
-                <a:spcPct val="0"/>
-              </a:spcBef>
-              <a:spcAft>
-                <a:spcPct val="0"/>
-              </a:spcAft>
-              <a:defRPr sz="2400">
-                <a:solidFill>
-                  <a:schemeClr val="tx1"/>
-                </a:solidFill>
-                <a:latin typeface="Arial" charset="0"/>
-              </a:defRPr>
-            </a:lvl9pPr>
-          </a:lstStyle>
-          <a:p>
-            <a:pPr eaLnBrk="1" hangingPunct="1">
-              <a:spcBef>
-                <a:spcPct val="30000"/>
-              </a:spcBef>
-            </a:pPr>
-            <a:r>
-              <a:rPr lang="de-DE" altLang="de-DE" sz="1300" b="1" dirty="0">
-                <a:solidFill>
-                  <a:srgbClr val="000000"/>
-                </a:solidFill>
-              </a:rPr>
-              <a:t>BILD</a:t>
-            </a:r>
-          </a:p>
-          <a:p>
-            <a:pPr eaLnBrk="1" hangingPunct="1">
-              <a:spcBef>
-                <a:spcPct val="30000"/>
-              </a:spcBef>
-            </a:pPr>
-            <a:r>
-              <a:rPr lang="de-DE" altLang="de-DE" sz="1300" dirty="0">
-                <a:solidFill>
-                  <a:srgbClr val="000000"/>
-                </a:solidFill>
-              </a:rPr>
-              <a:t>Positionierungsfläche für Bilder.</a:t>
-            </a:r>
-          </a:p>
-          <a:p>
-            <a:pPr eaLnBrk="1" hangingPunct="1">
-              <a:spcBef>
-                <a:spcPct val="30000"/>
-              </a:spcBef>
-            </a:pPr>
-            <a:r>
-              <a:rPr lang="de-DE" altLang="de-DE" sz="1300" dirty="0">
-                <a:solidFill>
-                  <a:srgbClr val="000000"/>
-                </a:solidFill>
-              </a:rPr>
-              <a:t>Bitte in linker oberer Ecke beginnen.</a:t>
-            </a:r>
-          </a:p>
-          <a:p>
-            <a:pPr eaLnBrk="1" hangingPunct="1">
-              <a:spcBef>
-                <a:spcPct val="30000"/>
-              </a:spcBef>
-            </a:pPr>
-            <a:r>
-              <a:rPr lang="de-DE" altLang="de-DE" sz="1300" dirty="0">
-                <a:solidFill>
-                  <a:srgbClr val="000000"/>
-                </a:solidFill>
-              </a:rPr>
-              <a:t>Bis maximal rechte und/oder untere Begrenzung, ggf. Bild beschneiden.</a:t>
-            </a:r>
-          </a:p>
-          <a:p>
-            <a:pPr eaLnBrk="1" hangingPunct="1">
-              <a:spcBef>
-                <a:spcPct val="30000"/>
-              </a:spcBef>
-            </a:pPr>
-            <a:endParaRPr lang="de-DE" altLang="de-DE" sz="1300" dirty="0">
-              <a:solidFill>
-                <a:srgbClr val="000000"/>
-              </a:solidFill>
-            </a:endParaRPr>
-          </a:p>
-        </p:txBody>
-      </p:sp>
-      <p:sp>
-        <p:nvSpPr>
-          <p:cNvPr id="8" name="Rectangle 11"/>
-          <p:cNvSpPr>
-            <a:spLocks noChangeArrowheads="1"/>
-          </p:cNvSpPr>
-          <p:nvPr/>
-        </p:nvSpPr>
-        <p:spPr bwMode="gray">
-          <a:xfrm>
-            <a:off x="4932363" y="5373688"/>
-            <a:ext cx="3743325" cy="863600"/>
-          </a:xfrm>
-          <a:prstGeom prst="rect">
-            <a:avLst/>
-          </a:prstGeom>
-          <a:noFill/>
-          <a:ln>
-            <a:noFill/>
-          </a:ln>
-          <a:effectLst/>
-          <a:extLst>
-            <a:ext uri="{909E8E84-426E-40DD-AFC4-6F175D3DCCD1}">
-              <a14:hiddenFill xmlns:a14="http://schemas.microsoft.com/office/drawing/2010/main">
-                <a:solidFill>
-                  <a:schemeClr val="tx2"/>
-                </a:solidFill>
-              </a14:hiddenFill>
-            </a:ext>
-            <a:ext uri="{91240B29-F687-4F45-9708-019B960494DF}">
-              <a14:hiddenLine xmlns:a14="http://schemas.microsoft.com/office/drawing/2010/main" w="9525">
-                <a:solidFill>
-                  <a:schemeClr val="tx1"/>
-                </a:solidFill>
-                <a:miter lim="800000"/>
-                <a:headEnd/>
-                <a:tailEnd/>
-              </a14:hiddenLine>
-            </a:ext>
-            <a:ext uri="{AF507438-7753-43E0-B8FC-AC1667EBCBE1}">
-              <a14:hiddenEffects xmlns:a14="http://schemas.microsoft.com/office/drawing/2010/main">
-                <a:effectLst>
-                  <a:outerShdw dist="35921" dir="2700000" algn="ctr" rotWithShape="0">
-                    <a:schemeClr val="bg2"/>
-                  </a:outerShdw>
-                </a:effectLst>
-              </a14:hiddenEffects>
-            </a:ext>
-          </a:extLst>
-        </p:spPr>
-        <p:txBody>
-          <a:bodyPr lIns="0" tIns="0" rIns="0" bIns="0"/>
-          <a:lstStyle>
-            <a:lvl1pPr algn="l">
-              <a:defRPr sz="2400">
-                <a:solidFill>
-                  <a:schemeClr val="tx1"/>
-                </a:solidFill>
-                <a:latin typeface="Arial" charset="0"/>
-              </a:defRPr>
-            </a:lvl1pPr>
-            <a:lvl2pPr marL="188913" indent="133350" algn="l">
-              <a:defRPr sz="2400">
-                <a:solidFill>
-                  <a:schemeClr val="tx1"/>
-                </a:solidFill>
-                <a:latin typeface="Arial" charset="0"/>
-              </a:defRPr>
-            </a:lvl2pPr>
-            <a:lvl3pPr marL="339725" indent="123825" algn="l">
-              <a:defRPr sz="2400">
-                <a:solidFill>
-                  <a:schemeClr val="tx1"/>
-                </a:solidFill>
-                <a:latin typeface="Arial" charset="0"/>
-              </a:defRPr>
-            </a:lvl3pPr>
-            <a:lvl4pPr marL="479425" indent="123825" algn="l">
-              <a:defRPr sz="2400">
-                <a:solidFill>
-                  <a:schemeClr val="tx1"/>
-                </a:solidFill>
-                <a:latin typeface="Arial" charset="0"/>
-              </a:defRPr>
-            </a:lvl4pPr>
-            <a:lvl5pPr marL="622300" indent="120650" algn="l">
-              <a:defRPr sz="2400">
-                <a:solidFill>
-                  <a:schemeClr val="tx1"/>
-                </a:solidFill>
-                <a:latin typeface="Arial" charset="0"/>
-              </a:defRPr>
-            </a:lvl5pPr>
-            <a:lvl6pPr marL="1079500" indent="120650" eaLnBrk="0" fontAlgn="base" hangingPunct="0">
-              <a:spcBef>
-                <a:spcPct val="0"/>
-              </a:spcBef>
-              <a:spcAft>
-                <a:spcPct val="0"/>
-              </a:spcAft>
-              <a:defRPr sz="2400">
-                <a:solidFill>
-                  <a:schemeClr val="tx1"/>
-                </a:solidFill>
-                <a:latin typeface="Arial" charset="0"/>
-              </a:defRPr>
-            </a:lvl6pPr>
-            <a:lvl7pPr marL="1536700" indent="120650" eaLnBrk="0" fontAlgn="base" hangingPunct="0">
-              <a:spcBef>
-                <a:spcPct val="0"/>
-              </a:spcBef>
-              <a:spcAft>
-                <a:spcPct val="0"/>
-              </a:spcAft>
-              <a:defRPr sz="2400">
-                <a:solidFill>
-                  <a:schemeClr val="tx1"/>
-                </a:solidFill>
-                <a:latin typeface="Arial" charset="0"/>
-              </a:defRPr>
-            </a:lvl7pPr>
-            <a:lvl8pPr marL="1993900" indent="120650" eaLnBrk="0" fontAlgn="base" hangingPunct="0">
-              <a:spcBef>
-                <a:spcPct val="0"/>
-              </a:spcBef>
-              <a:spcAft>
-                <a:spcPct val="0"/>
-              </a:spcAft>
-              <a:defRPr sz="2400">
-                <a:solidFill>
-                  <a:schemeClr val="tx1"/>
-                </a:solidFill>
-                <a:latin typeface="Arial" charset="0"/>
-              </a:defRPr>
-            </a:lvl8pPr>
-            <a:lvl9pPr marL="2451100" indent="120650" eaLnBrk="0" fontAlgn="base" hangingPunct="0">
-              <a:spcBef>
-                <a:spcPct val="0"/>
-              </a:spcBef>
-              <a:spcAft>
-                <a:spcPct val="0"/>
-              </a:spcAft>
-              <a:defRPr sz="2400">
-                <a:solidFill>
-                  <a:schemeClr val="tx1"/>
-                </a:solidFill>
-                <a:latin typeface="Arial" charset="0"/>
-              </a:defRPr>
-            </a:lvl9pPr>
-          </a:lstStyle>
-          <a:p>
-            <a:pPr eaLnBrk="1" hangingPunct="1">
-              <a:lnSpc>
-                <a:spcPct val="110000"/>
-              </a:lnSpc>
-              <a:spcAft>
-                <a:spcPct val="20000"/>
-              </a:spcAft>
-            </a:pPr>
-            <a:r>
-              <a:rPr lang="de-DE" altLang="de-DE" sz="1500">
-                <a:solidFill>
-                  <a:srgbClr val="000000"/>
-                </a:solidFill>
-              </a:rPr>
-              <a:t>Es war der erste und entscheidende Schritt in seiner Entwicklung geschehen. </a:t>
-            </a:r>
-          </a:p>
-        </p:txBody>
-      </p:sp>
-      <p:sp>
-        <p:nvSpPr>
-          <p:cNvPr id="9" name="Rectangle 12"/>
-          <p:cNvSpPr>
-            <a:spLocks noChangeArrowheads="1"/>
-          </p:cNvSpPr>
-          <p:nvPr/>
-        </p:nvSpPr>
-        <p:spPr bwMode="invGray">
-          <a:xfrm>
-            <a:off x="4932363" y="2060848"/>
-            <a:ext cx="3743325" cy="3096940"/>
-          </a:xfrm>
-          <a:prstGeom prst="rect">
-            <a:avLst/>
-          </a:prstGeom>
-          <a:solidFill>
-            <a:srgbClr val="C0C0C0"/>
-          </a:solidFill>
-          <a:ln>
-            <a:noFill/>
-          </a:ln>
-          <a:effectLst/>
-          <a:extLst>
-            <a:ext uri="{91240B29-F687-4F45-9708-019B960494DF}">
-              <a14:hiddenLine xmlns:a14="http://schemas.microsoft.com/office/drawing/2010/main" w="19050" algn="ctr">
-                <a:solidFill>
-                  <a:schemeClr val="tx2"/>
-                </a:solidFill>
-                <a:miter lim="800000"/>
-                <a:headEnd/>
-                <a:tailEnd/>
-              </a14:hiddenLine>
-            </a:ext>
-            <a:ext uri="{AF507438-7753-43E0-B8FC-AC1667EBCBE1}">
-              <a14:hiddenEffects xmlns:a14="http://schemas.microsoft.com/office/drawing/2010/main">
-                <a:effectLst>
-                  <a:outerShdw dist="35921" dir="2700000" algn="ctr" rotWithShape="0">
-                    <a:schemeClr val="bg2"/>
-                  </a:outerShdw>
-                </a:effectLst>
-              </a14:hiddenEffects>
-            </a:ext>
-          </a:extLst>
-        </p:spPr>
-        <p:txBody>
-          <a:bodyPr lIns="0" tIns="0" rIns="0" bIns="0" anchor="ctr"/>
-          <a:lstStyle>
-            <a:lvl1pPr marL="376238" algn="l">
-              <a:defRPr sz="2400">
-                <a:solidFill>
-                  <a:schemeClr val="tx1"/>
-                </a:solidFill>
-                <a:latin typeface="Arial" charset="0"/>
-              </a:defRPr>
-            </a:lvl1pPr>
-            <a:lvl2pPr marL="566738" algn="l">
-              <a:defRPr sz="2400">
-                <a:solidFill>
-                  <a:schemeClr val="tx1"/>
-                </a:solidFill>
-                <a:latin typeface="Arial" charset="0"/>
-              </a:defRPr>
-            </a:lvl2pPr>
-            <a:lvl3pPr algn="l">
-              <a:defRPr sz="2400">
-                <a:solidFill>
-                  <a:schemeClr val="tx1"/>
-                </a:solidFill>
-                <a:latin typeface="Arial" charset="0"/>
-              </a:defRPr>
-            </a:lvl3pPr>
-            <a:lvl4pPr algn="l">
-              <a:defRPr sz="2400">
-                <a:solidFill>
-                  <a:schemeClr val="tx1"/>
-                </a:solidFill>
-                <a:latin typeface="Arial" charset="0"/>
-              </a:defRPr>
-            </a:lvl4pPr>
-            <a:lvl5pPr algn="l">
-              <a:defRPr sz="2400">
-                <a:solidFill>
-                  <a:schemeClr val="tx1"/>
-                </a:solidFill>
-                <a:latin typeface="Arial" charset="0"/>
-              </a:defRPr>
-            </a:lvl5pPr>
-            <a:lvl6pPr eaLnBrk="0" fontAlgn="base" hangingPunct="0">
-              <a:spcBef>
-                <a:spcPct val="0"/>
-              </a:spcBef>
-              <a:spcAft>
-                <a:spcPct val="0"/>
-              </a:spcAft>
-              <a:defRPr sz="2400">
-                <a:solidFill>
-                  <a:schemeClr val="tx1"/>
-                </a:solidFill>
-                <a:latin typeface="Arial" charset="0"/>
-              </a:defRPr>
-            </a:lvl6pPr>
-            <a:lvl7pPr eaLnBrk="0" fontAlgn="base" hangingPunct="0">
-              <a:spcBef>
-                <a:spcPct val="0"/>
-              </a:spcBef>
-              <a:spcAft>
-                <a:spcPct val="0"/>
-              </a:spcAft>
-              <a:defRPr sz="2400">
-                <a:solidFill>
-                  <a:schemeClr val="tx1"/>
-                </a:solidFill>
-                <a:latin typeface="Arial" charset="0"/>
-              </a:defRPr>
-            </a:lvl7pPr>
-            <a:lvl8pPr eaLnBrk="0" fontAlgn="base" hangingPunct="0">
-              <a:spcBef>
-                <a:spcPct val="0"/>
-              </a:spcBef>
-              <a:spcAft>
-                <a:spcPct val="0"/>
-              </a:spcAft>
-              <a:defRPr sz="2400">
-                <a:solidFill>
-                  <a:schemeClr val="tx1"/>
-                </a:solidFill>
-                <a:latin typeface="Arial" charset="0"/>
-              </a:defRPr>
-            </a:lvl8pPr>
-            <a:lvl9pPr eaLnBrk="0" fontAlgn="base" hangingPunct="0">
-              <a:spcBef>
-                <a:spcPct val="0"/>
-              </a:spcBef>
-              <a:spcAft>
-                <a:spcPct val="0"/>
-              </a:spcAft>
-              <a:defRPr sz="2400">
-                <a:solidFill>
-                  <a:schemeClr val="tx1"/>
-                </a:solidFill>
-                <a:latin typeface="Arial" charset="0"/>
-              </a:defRPr>
-            </a:lvl9pPr>
-          </a:lstStyle>
-          <a:p>
-            <a:pPr eaLnBrk="1" hangingPunct="1">
-              <a:spcBef>
-                <a:spcPct val="30000"/>
-              </a:spcBef>
-            </a:pPr>
-            <a:r>
-              <a:rPr lang="de-DE" altLang="de-DE" sz="1300" b="1" dirty="0">
-                <a:solidFill>
-                  <a:srgbClr val="000000"/>
-                </a:solidFill>
-              </a:rPr>
-              <a:t>BILD</a:t>
-            </a:r>
-          </a:p>
-          <a:p>
-            <a:pPr eaLnBrk="1" hangingPunct="1">
-              <a:spcBef>
-                <a:spcPct val="30000"/>
-              </a:spcBef>
-            </a:pPr>
-            <a:r>
-              <a:rPr lang="de-DE" altLang="de-DE" sz="1300" dirty="0">
-                <a:solidFill>
-                  <a:srgbClr val="000000"/>
-                </a:solidFill>
-              </a:rPr>
-              <a:t>Positionierungsfläche für Bilder.</a:t>
-            </a:r>
-          </a:p>
-          <a:p>
-            <a:pPr eaLnBrk="1" hangingPunct="1">
-              <a:spcBef>
-                <a:spcPct val="30000"/>
-              </a:spcBef>
-            </a:pPr>
-            <a:r>
-              <a:rPr lang="de-DE" altLang="de-DE" sz="1300" dirty="0">
-                <a:solidFill>
-                  <a:srgbClr val="000000"/>
-                </a:solidFill>
-              </a:rPr>
-              <a:t>Bitte in linker oberer Ecke beginnen.</a:t>
-            </a:r>
-          </a:p>
-          <a:p>
-            <a:pPr eaLnBrk="1" hangingPunct="1">
-              <a:spcBef>
-                <a:spcPct val="30000"/>
-              </a:spcBef>
-            </a:pPr>
-            <a:r>
-              <a:rPr lang="de-DE" altLang="de-DE" sz="1300" dirty="0">
-                <a:solidFill>
-                  <a:srgbClr val="000000"/>
-                </a:solidFill>
-              </a:rPr>
-              <a:t>Bis maximal rechte und/oder untere Begrenzung, ggf. Bild beschneiden.</a:t>
-            </a:r>
-          </a:p>
-          <a:p>
-            <a:pPr eaLnBrk="1" hangingPunct="1">
-              <a:spcBef>
-                <a:spcPct val="30000"/>
-              </a:spcBef>
-            </a:pPr>
-            <a:endParaRPr lang="de-DE" altLang="de-DE" sz="1300" dirty="0">
-              <a:solidFill>
-                <a:srgbClr val="000000"/>
-              </a:solidFill>
-            </a:endParaRPr>
-          </a:p>
-        </p:txBody>
-      </p:sp>
-      <p:sp>
-        <p:nvSpPr>
-          <p:cNvPr id="2" name="Fußzeilenplatzhalter 1"/>
-          <p:cNvSpPr>
-            <a:spLocks noGrp="1"/>
-          </p:cNvSpPr>
-          <p:nvPr>
-            <p:ph type="ftr" sz="quarter" idx="10"/>
-          </p:nvPr>
-        </p:nvSpPr>
-        <p:spPr/>
-        <p:txBody>
-          <a:bodyPr/>
-          <a:lstStyle/>
-          <a:p>
-            <a:r>
-              <a:rPr lang="en-US" altLang="de-DE"/>
-              <a:t>SIP2 Zwischenpräsentation | Uschakow | Alhanoun | Skiadas</a:t>
-            </a:r>
-            <a:endParaRPr lang="de-DE" altLang="de-DE" dirty="0"/>
-          </a:p>
-        </p:txBody>
-      </p:sp>
-      <p:sp>
-        <p:nvSpPr>
-          <p:cNvPr id="10" name="Foliennummernplatzhalter 9"/>
-          <p:cNvSpPr>
-            <a:spLocks noGrp="1"/>
-          </p:cNvSpPr>
-          <p:nvPr>
-            <p:ph type="sldNum" sz="quarter" idx="11"/>
-          </p:nvPr>
-        </p:nvSpPr>
-        <p:spPr/>
-        <p:txBody>
-          <a:bodyPr/>
-          <a:lstStyle/>
-          <a:p>
-            <a:fld id="{57D12BB6-0ED4-46B6-AB23-7758AD07EFBF}" type="slidenum">
-              <a:rPr lang="de-DE" smtClean="0"/>
-              <a:pPr/>
-              <a:t>11</a:t>
-            </a:fld>
-            <a:endParaRPr lang="de-DE" dirty="0"/>
-          </a:p>
-        </p:txBody>
-      </p:sp>
-    </p:spTree>
-    <p:extLst>
-      <p:ext uri="{BB962C8B-B14F-4D97-AF65-F5344CB8AC3E}">
-        <p14:creationId xmlns:p14="http://schemas.microsoft.com/office/powerpoint/2010/main" val="1276860995"/>
       </p:ext>
     </p:extLst>
   </p:cSld>
@@ -5731,6 +5244,919 @@
         <p:spPr>
           <a:xfrm>
             <a:off x="971550" y="1404000"/>
+            <a:ext cx="6984826" cy="792162"/>
+          </a:xfrm>
+        </p:spPr>
+        <p:txBody>
+          <a:bodyPr/>
+          <a:lstStyle/>
+          <a:p>
+            <a:r>
+              <a:rPr lang="de-DE" altLang="de-DE" dirty="0"/>
+              <a:t>Überschrift Bildfolie – zwei Bilder mit Text</a:t>
+            </a:r>
+          </a:p>
+        </p:txBody>
+      </p:sp>
+      <p:sp>
+        <p:nvSpPr>
+          <p:cNvPr id="6" name="Rectangle 3"/>
+          <p:cNvSpPr txBox="1">
+            <a:spLocks noChangeArrowheads="1"/>
+          </p:cNvSpPr>
+          <p:nvPr/>
+        </p:nvSpPr>
+        <p:spPr>
+          <a:xfrm>
+            <a:off x="971550" y="5373688"/>
+            <a:ext cx="3744913" cy="863600"/>
+          </a:xfrm>
+          <a:prstGeom prst="rect">
+            <a:avLst/>
+          </a:prstGeom>
+        </p:spPr>
+        <p:txBody>
+          <a:bodyPr/>
+          <a:lstStyle>
+            <a:lvl1pPr algn="l" rtl="0" eaLnBrk="1" fontAlgn="base" hangingPunct="1">
+              <a:lnSpc>
+                <a:spcPct val="110000"/>
+              </a:lnSpc>
+              <a:spcBef>
+                <a:spcPct val="0"/>
+              </a:spcBef>
+              <a:spcAft>
+                <a:spcPct val="20000"/>
+              </a:spcAft>
+              <a:defRPr>
+                <a:solidFill>
+                  <a:schemeClr val="tx1"/>
+                </a:solidFill>
+                <a:latin typeface="+mn-lt"/>
+                <a:ea typeface="+mn-ea"/>
+                <a:cs typeface="+mn-cs"/>
+              </a:defRPr>
+            </a:lvl1pPr>
+            <a:lvl2pPr marL="182563" indent="-180975" algn="l" rtl="0" eaLnBrk="1" fontAlgn="base" hangingPunct="1">
+              <a:lnSpc>
+                <a:spcPct val="110000"/>
+              </a:lnSpc>
+              <a:spcBef>
+                <a:spcPct val="0"/>
+              </a:spcBef>
+              <a:spcAft>
+                <a:spcPct val="20000"/>
+              </a:spcAft>
+              <a:buFont typeface="Arial" charset="0"/>
+              <a:buChar char="•"/>
+              <a:defRPr>
+                <a:solidFill>
+                  <a:schemeClr val="tx1"/>
+                </a:solidFill>
+                <a:latin typeface="+mn-lt"/>
+              </a:defRPr>
+            </a:lvl2pPr>
+            <a:lvl3pPr marL="366713" indent="-182563" algn="l" rtl="0" eaLnBrk="1" fontAlgn="base" hangingPunct="1">
+              <a:lnSpc>
+                <a:spcPct val="110000"/>
+              </a:lnSpc>
+              <a:spcBef>
+                <a:spcPct val="0"/>
+              </a:spcBef>
+              <a:spcAft>
+                <a:spcPct val="20000"/>
+              </a:spcAft>
+              <a:buFont typeface="Arial" charset="0"/>
+              <a:buChar char="•"/>
+              <a:defRPr>
+                <a:solidFill>
+                  <a:schemeClr val="tx1"/>
+                </a:solidFill>
+                <a:latin typeface="+mn-lt"/>
+              </a:defRPr>
+            </a:lvl3pPr>
+            <a:lvl4pPr marL="552450" indent="-184150" algn="l" rtl="0" eaLnBrk="1" fontAlgn="base" hangingPunct="1">
+              <a:lnSpc>
+                <a:spcPct val="110000"/>
+              </a:lnSpc>
+              <a:spcBef>
+                <a:spcPct val="0"/>
+              </a:spcBef>
+              <a:spcAft>
+                <a:spcPct val="20000"/>
+              </a:spcAft>
+              <a:buFont typeface="Arial" charset="0"/>
+              <a:buChar char="•"/>
+              <a:defRPr>
+                <a:solidFill>
+                  <a:schemeClr val="tx1"/>
+                </a:solidFill>
+                <a:latin typeface="+mn-lt"/>
+              </a:defRPr>
+            </a:lvl4pPr>
+            <a:lvl5pPr marL="738188" indent="-184150" algn="l" rtl="0" eaLnBrk="1" fontAlgn="base" hangingPunct="1">
+              <a:lnSpc>
+                <a:spcPct val="110000"/>
+              </a:lnSpc>
+              <a:spcBef>
+                <a:spcPct val="0"/>
+              </a:spcBef>
+              <a:spcAft>
+                <a:spcPct val="20000"/>
+              </a:spcAft>
+              <a:buFont typeface="Arial" charset="0"/>
+              <a:buChar char="•"/>
+              <a:defRPr>
+                <a:solidFill>
+                  <a:schemeClr val="tx1"/>
+                </a:solidFill>
+                <a:latin typeface="+mn-lt"/>
+              </a:defRPr>
+            </a:lvl5pPr>
+            <a:lvl6pPr marL="1195388" indent="-184150" algn="l" rtl="0" eaLnBrk="1" fontAlgn="base" hangingPunct="1">
+              <a:lnSpc>
+                <a:spcPct val="110000"/>
+              </a:lnSpc>
+              <a:spcBef>
+                <a:spcPct val="0"/>
+              </a:spcBef>
+              <a:spcAft>
+                <a:spcPct val="20000"/>
+              </a:spcAft>
+              <a:buFont typeface="Arial" charset="0"/>
+              <a:buChar char="•"/>
+              <a:defRPr>
+                <a:solidFill>
+                  <a:schemeClr val="tx1"/>
+                </a:solidFill>
+                <a:latin typeface="+mn-lt"/>
+              </a:defRPr>
+            </a:lvl6pPr>
+            <a:lvl7pPr marL="1652588" indent="-184150" algn="l" rtl="0" eaLnBrk="1" fontAlgn="base" hangingPunct="1">
+              <a:lnSpc>
+                <a:spcPct val="110000"/>
+              </a:lnSpc>
+              <a:spcBef>
+                <a:spcPct val="0"/>
+              </a:spcBef>
+              <a:spcAft>
+                <a:spcPct val="20000"/>
+              </a:spcAft>
+              <a:buFont typeface="Arial" charset="0"/>
+              <a:buChar char="•"/>
+              <a:defRPr>
+                <a:solidFill>
+                  <a:schemeClr val="tx1"/>
+                </a:solidFill>
+                <a:latin typeface="+mn-lt"/>
+              </a:defRPr>
+            </a:lvl7pPr>
+            <a:lvl8pPr marL="2109788" indent="-184150" algn="l" rtl="0" eaLnBrk="1" fontAlgn="base" hangingPunct="1">
+              <a:lnSpc>
+                <a:spcPct val="110000"/>
+              </a:lnSpc>
+              <a:spcBef>
+                <a:spcPct val="0"/>
+              </a:spcBef>
+              <a:spcAft>
+                <a:spcPct val="20000"/>
+              </a:spcAft>
+              <a:buFont typeface="Arial" charset="0"/>
+              <a:buChar char="•"/>
+              <a:defRPr>
+                <a:solidFill>
+                  <a:schemeClr val="tx1"/>
+                </a:solidFill>
+                <a:latin typeface="+mn-lt"/>
+              </a:defRPr>
+            </a:lvl8pPr>
+            <a:lvl9pPr marL="2566988" indent="-184150" algn="l" rtl="0" eaLnBrk="1" fontAlgn="base" hangingPunct="1">
+              <a:lnSpc>
+                <a:spcPct val="110000"/>
+              </a:lnSpc>
+              <a:spcBef>
+                <a:spcPct val="0"/>
+              </a:spcBef>
+              <a:spcAft>
+                <a:spcPct val="20000"/>
+              </a:spcAft>
+              <a:buFont typeface="Arial" charset="0"/>
+              <a:buChar char="•"/>
+              <a:defRPr>
+                <a:solidFill>
+                  <a:schemeClr val="tx1"/>
+                </a:solidFill>
+                <a:latin typeface="+mn-lt"/>
+              </a:defRPr>
+            </a:lvl9pPr>
+          </a:lstStyle>
+          <a:p>
+            <a:r>
+              <a:rPr lang="de-DE" altLang="de-DE" sz="1500" kern="0"/>
+              <a:t>Mit seiner Aufnahme in die Elite war Knechts Leben auf eine andre Ebene verpflanzt.</a:t>
+            </a:r>
+          </a:p>
+        </p:txBody>
+      </p:sp>
+      <p:sp>
+        <p:nvSpPr>
+          <p:cNvPr id="7" name="Rectangle 4"/>
+          <p:cNvSpPr>
+            <a:spLocks noChangeArrowheads="1"/>
+          </p:cNvSpPr>
+          <p:nvPr/>
+        </p:nvSpPr>
+        <p:spPr bwMode="invGray">
+          <a:xfrm>
+            <a:off x="971550" y="2060848"/>
+            <a:ext cx="3744913" cy="3096940"/>
+          </a:xfrm>
+          <a:prstGeom prst="rect">
+            <a:avLst/>
+          </a:prstGeom>
+          <a:solidFill>
+            <a:srgbClr val="C0C0C0"/>
+          </a:solidFill>
+          <a:ln>
+            <a:noFill/>
+          </a:ln>
+          <a:effectLst/>
+          <a:extLst>
+            <a:ext uri="{91240B29-F687-4F45-9708-019B960494DF}">
+              <a14:hiddenLine xmlns:a14="http://schemas.microsoft.com/office/drawing/2010/main" w="19050" algn="ctr">
+                <a:solidFill>
+                  <a:schemeClr val="tx2"/>
+                </a:solidFill>
+                <a:miter lim="800000"/>
+                <a:headEnd/>
+                <a:tailEnd/>
+              </a14:hiddenLine>
+            </a:ext>
+            <a:ext uri="{AF507438-7753-43E0-B8FC-AC1667EBCBE1}">
+              <a14:hiddenEffects xmlns:a14="http://schemas.microsoft.com/office/drawing/2010/main">
+                <a:effectLst>
+                  <a:outerShdw dist="35921" dir="2700000" algn="ctr" rotWithShape="0">
+                    <a:schemeClr val="bg2"/>
+                  </a:outerShdw>
+                </a:effectLst>
+              </a14:hiddenEffects>
+            </a:ext>
+          </a:extLst>
+        </p:spPr>
+        <p:txBody>
+          <a:bodyPr lIns="0" tIns="0" rIns="0" bIns="0" anchor="ctr"/>
+          <a:lstStyle>
+            <a:lvl1pPr marL="376238" algn="l">
+              <a:defRPr sz="2400">
+                <a:solidFill>
+                  <a:schemeClr val="tx1"/>
+                </a:solidFill>
+                <a:latin typeface="Arial" charset="0"/>
+              </a:defRPr>
+            </a:lvl1pPr>
+            <a:lvl2pPr marL="566738" algn="l">
+              <a:defRPr sz="2400">
+                <a:solidFill>
+                  <a:schemeClr val="tx1"/>
+                </a:solidFill>
+                <a:latin typeface="Arial" charset="0"/>
+              </a:defRPr>
+            </a:lvl2pPr>
+            <a:lvl3pPr algn="l">
+              <a:defRPr sz="2400">
+                <a:solidFill>
+                  <a:schemeClr val="tx1"/>
+                </a:solidFill>
+                <a:latin typeface="Arial" charset="0"/>
+              </a:defRPr>
+            </a:lvl3pPr>
+            <a:lvl4pPr algn="l">
+              <a:defRPr sz="2400">
+                <a:solidFill>
+                  <a:schemeClr val="tx1"/>
+                </a:solidFill>
+                <a:latin typeface="Arial" charset="0"/>
+              </a:defRPr>
+            </a:lvl4pPr>
+            <a:lvl5pPr algn="l">
+              <a:defRPr sz="2400">
+                <a:solidFill>
+                  <a:schemeClr val="tx1"/>
+                </a:solidFill>
+                <a:latin typeface="Arial" charset="0"/>
+              </a:defRPr>
+            </a:lvl5pPr>
+            <a:lvl6pPr eaLnBrk="0" fontAlgn="base" hangingPunct="0">
+              <a:spcBef>
+                <a:spcPct val="0"/>
+              </a:spcBef>
+              <a:spcAft>
+                <a:spcPct val="0"/>
+              </a:spcAft>
+              <a:defRPr sz="2400">
+                <a:solidFill>
+                  <a:schemeClr val="tx1"/>
+                </a:solidFill>
+                <a:latin typeface="Arial" charset="0"/>
+              </a:defRPr>
+            </a:lvl6pPr>
+            <a:lvl7pPr eaLnBrk="0" fontAlgn="base" hangingPunct="0">
+              <a:spcBef>
+                <a:spcPct val="0"/>
+              </a:spcBef>
+              <a:spcAft>
+                <a:spcPct val="0"/>
+              </a:spcAft>
+              <a:defRPr sz="2400">
+                <a:solidFill>
+                  <a:schemeClr val="tx1"/>
+                </a:solidFill>
+                <a:latin typeface="Arial" charset="0"/>
+              </a:defRPr>
+            </a:lvl7pPr>
+            <a:lvl8pPr eaLnBrk="0" fontAlgn="base" hangingPunct="0">
+              <a:spcBef>
+                <a:spcPct val="0"/>
+              </a:spcBef>
+              <a:spcAft>
+                <a:spcPct val="0"/>
+              </a:spcAft>
+              <a:defRPr sz="2400">
+                <a:solidFill>
+                  <a:schemeClr val="tx1"/>
+                </a:solidFill>
+                <a:latin typeface="Arial" charset="0"/>
+              </a:defRPr>
+            </a:lvl8pPr>
+            <a:lvl9pPr eaLnBrk="0" fontAlgn="base" hangingPunct="0">
+              <a:spcBef>
+                <a:spcPct val="0"/>
+              </a:spcBef>
+              <a:spcAft>
+                <a:spcPct val="0"/>
+              </a:spcAft>
+              <a:defRPr sz="2400">
+                <a:solidFill>
+                  <a:schemeClr val="tx1"/>
+                </a:solidFill>
+                <a:latin typeface="Arial" charset="0"/>
+              </a:defRPr>
+            </a:lvl9pPr>
+          </a:lstStyle>
+          <a:p>
+            <a:pPr eaLnBrk="1" hangingPunct="1">
+              <a:spcBef>
+                <a:spcPct val="30000"/>
+              </a:spcBef>
+            </a:pPr>
+            <a:r>
+              <a:rPr lang="de-DE" altLang="de-DE" sz="1300" b="1" dirty="0">
+                <a:solidFill>
+                  <a:srgbClr val="000000"/>
+                </a:solidFill>
+              </a:rPr>
+              <a:t>BILD</a:t>
+            </a:r>
+          </a:p>
+          <a:p>
+            <a:pPr eaLnBrk="1" hangingPunct="1">
+              <a:spcBef>
+                <a:spcPct val="30000"/>
+              </a:spcBef>
+            </a:pPr>
+            <a:r>
+              <a:rPr lang="de-DE" altLang="de-DE" sz="1300" dirty="0">
+                <a:solidFill>
+                  <a:srgbClr val="000000"/>
+                </a:solidFill>
+              </a:rPr>
+              <a:t>Positionierungsfläche für Bilder.</a:t>
+            </a:r>
+          </a:p>
+          <a:p>
+            <a:pPr eaLnBrk="1" hangingPunct="1">
+              <a:spcBef>
+                <a:spcPct val="30000"/>
+              </a:spcBef>
+            </a:pPr>
+            <a:r>
+              <a:rPr lang="de-DE" altLang="de-DE" sz="1300" dirty="0">
+                <a:solidFill>
+                  <a:srgbClr val="000000"/>
+                </a:solidFill>
+              </a:rPr>
+              <a:t>Bitte in linker oberer Ecke beginnen.</a:t>
+            </a:r>
+          </a:p>
+          <a:p>
+            <a:pPr eaLnBrk="1" hangingPunct="1">
+              <a:spcBef>
+                <a:spcPct val="30000"/>
+              </a:spcBef>
+            </a:pPr>
+            <a:r>
+              <a:rPr lang="de-DE" altLang="de-DE" sz="1300" dirty="0">
+                <a:solidFill>
+                  <a:srgbClr val="000000"/>
+                </a:solidFill>
+              </a:rPr>
+              <a:t>Bis maximal rechte und/oder untere Begrenzung, ggf. Bild beschneiden.</a:t>
+            </a:r>
+          </a:p>
+          <a:p>
+            <a:pPr eaLnBrk="1" hangingPunct="1">
+              <a:spcBef>
+                <a:spcPct val="30000"/>
+              </a:spcBef>
+            </a:pPr>
+            <a:endParaRPr lang="de-DE" altLang="de-DE" sz="1300" dirty="0">
+              <a:solidFill>
+                <a:srgbClr val="000000"/>
+              </a:solidFill>
+            </a:endParaRPr>
+          </a:p>
+        </p:txBody>
+      </p:sp>
+      <p:sp>
+        <p:nvSpPr>
+          <p:cNvPr id="8" name="Rectangle 11"/>
+          <p:cNvSpPr>
+            <a:spLocks noChangeArrowheads="1"/>
+          </p:cNvSpPr>
+          <p:nvPr/>
+        </p:nvSpPr>
+        <p:spPr bwMode="gray">
+          <a:xfrm>
+            <a:off x="4932363" y="5373688"/>
+            <a:ext cx="3743325" cy="863600"/>
+          </a:xfrm>
+          <a:prstGeom prst="rect">
+            <a:avLst/>
+          </a:prstGeom>
+          <a:noFill/>
+          <a:ln>
+            <a:noFill/>
+          </a:ln>
+          <a:effectLst/>
+          <a:extLst>
+            <a:ext uri="{909E8E84-426E-40DD-AFC4-6F175D3DCCD1}">
+              <a14:hiddenFill xmlns:a14="http://schemas.microsoft.com/office/drawing/2010/main">
+                <a:solidFill>
+                  <a:schemeClr val="tx2"/>
+                </a:solidFill>
+              </a14:hiddenFill>
+            </a:ext>
+            <a:ext uri="{91240B29-F687-4F45-9708-019B960494DF}">
+              <a14:hiddenLine xmlns:a14="http://schemas.microsoft.com/office/drawing/2010/main" w="9525">
+                <a:solidFill>
+                  <a:schemeClr val="tx1"/>
+                </a:solidFill>
+                <a:miter lim="800000"/>
+                <a:headEnd/>
+                <a:tailEnd/>
+              </a14:hiddenLine>
+            </a:ext>
+            <a:ext uri="{AF507438-7753-43E0-B8FC-AC1667EBCBE1}">
+              <a14:hiddenEffects xmlns:a14="http://schemas.microsoft.com/office/drawing/2010/main">
+                <a:effectLst>
+                  <a:outerShdw dist="35921" dir="2700000" algn="ctr" rotWithShape="0">
+                    <a:schemeClr val="bg2"/>
+                  </a:outerShdw>
+                </a:effectLst>
+              </a14:hiddenEffects>
+            </a:ext>
+          </a:extLst>
+        </p:spPr>
+        <p:txBody>
+          <a:bodyPr lIns="0" tIns="0" rIns="0" bIns="0"/>
+          <a:lstStyle>
+            <a:lvl1pPr algn="l">
+              <a:defRPr sz="2400">
+                <a:solidFill>
+                  <a:schemeClr val="tx1"/>
+                </a:solidFill>
+                <a:latin typeface="Arial" charset="0"/>
+              </a:defRPr>
+            </a:lvl1pPr>
+            <a:lvl2pPr marL="188913" indent="133350" algn="l">
+              <a:defRPr sz="2400">
+                <a:solidFill>
+                  <a:schemeClr val="tx1"/>
+                </a:solidFill>
+                <a:latin typeface="Arial" charset="0"/>
+              </a:defRPr>
+            </a:lvl2pPr>
+            <a:lvl3pPr marL="339725" indent="123825" algn="l">
+              <a:defRPr sz="2400">
+                <a:solidFill>
+                  <a:schemeClr val="tx1"/>
+                </a:solidFill>
+                <a:latin typeface="Arial" charset="0"/>
+              </a:defRPr>
+            </a:lvl3pPr>
+            <a:lvl4pPr marL="479425" indent="123825" algn="l">
+              <a:defRPr sz="2400">
+                <a:solidFill>
+                  <a:schemeClr val="tx1"/>
+                </a:solidFill>
+                <a:latin typeface="Arial" charset="0"/>
+              </a:defRPr>
+            </a:lvl4pPr>
+            <a:lvl5pPr marL="622300" indent="120650" algn="l">
+              <a:defRPr sz="2400">
+                <a:solidFill>
+                  <a:schemeClr val="tx1"/>
+                </a:solidFill>
+                <a:latin typeface="Arial" charset="0"/>
+              </a:defRPr>
+            </a:lvl5pPr>
+            <a:lvl6pPr marL="1079500" indent="120650" eaLnBrk="0" fontAlgn="base" hangingPunct="0">
+              <a:spcBef>
+                <a:spcPct val="0"/>
+              </a:spcBef>
+              <a:spcAft>
+                <a:spcPct val="0"/>
+              </a:spcAft>
+              <a:defRPr sz="2400">
+                <a:solidFill>
+                  <a:schemeClr val="tx1"/>
+                </a:solidFill>
+                <a:latin typeface="Arial" charset="0"/>
+              </a:defRPr>
+            </a:lvl6pPr>
+            <a:lvl7pPr marL="1536700" indent="120650" eaLnBrk="0" fontAlgn="base" hangingPunct="0">
+              <a:spcBef>
+                <a:spcPct val="0"/>
+              </a:spcBef>
+              <a:spcAft>
+                <a:spcPct val="0"/>
+              </a:spcAft>
+              <a:defRPr sz="2400">
+                <a:solidFill>
+                  <a:schemeClr val="tx1"/>
+                </a:solidFill>
+                <a:latin typeface="Arial" charset="0"/>
+              </a:defRPr>
+            </a:lvl7pPr>
+            <a:lvl8pPr marL="1993900" indent="120650" eaLnBrk="0" fontAlgn="base" hangingPunct="0">
+              <a:spcBef>
+                <a:spcPct val="0"/>
+              </a:spcBef>
+              <a:spcAft>
+                <a:spcPct val="0"/>
+              </a:spcAft>
+              <a:defRPr sz="2400">
+                <a:solidFill>
+                  <a:schemeClr val="tx1"/>
+                </a:solidFill>
+                <a:latin typeface="Arial" charset="0"/>
+              </a:defRPr>
+            </a:lvl8pPr>
+            <a:lvl9pPr marL="2451100" indent="120650" eaLnBrk="0" fontAlgn="base" hangingPunct="0">
+              <a:spcBef>
+                <a:spcPct val="0"/>
+              </a:spcBef>
+              <a:spcAft>
+                <a:spcPct val="0"/>
+              </a:spcAft>
+              <a:defRPr sz="2400">
+                <a:solidFill>
+                  <a:schemeClr val="tx1"/>
+                </a:solidFill>
+                <a:latin typeface="Arial" charset="0"/>
+              </a:defRPr>
+            </a:lvl9pPr>
+          </a:lstStyle>
+          <a:p>
+            <a:pPr eaLnBrk="1" hangingPunct="1">
+              <a:lnSpc>
+                <a:spcPct val="110000"/>
+              </a:lnSpc>
+              <a:spcAft>
+                <a:spcPct val="20000"/>
+              </a:spcAft>
+            </a:pPr>
+            <a:r>
+              <a:rPr lang="de-DE" altLang="de-DE" sz="1500">
+                <a:solidFill>
+                  <a:srgbClr val="000000"/>
+                </a:solidFill>
+              </a:rPr>
+              <a:t>Es war der erste und entscheidende Schritt in seiner Entwicklung geschehen. </a:t>
+            </a:r>
+          </a:p>
+        </p:txBody>
+      </p:sp>
+      <p:sp>
+        <p:nvSpPr>
+          <p:cNvPr id="9" name="Rectangle 12"/>
+          <p:cNvSpPr>
+            <a:spLocks noChangeArrowheads="1"/>
+          </p:cNvSpPr>
+          <p:nvPr/>
+        </p:nvSpPr>
+        <p:spPr bwMode="invGray">
+          <a:xfrm>
+            <a:off x="4932363" y="2060848"/>
+            <a:ext cx="3743325" cy="3096940"/>
+          </a:xfrm>
+          <a:prstGeom prst="rect">
+            <a:avLst/>
+          </a:prstGeom>
+          <a:solidFill>
+            <a:srgbClr val="C0C0C0"/>
+          </a:solidFill>
+          <a:ln>
+            <a:noFill/>
+          </a:ln>
+          <a:effectLst/>
+          <a:extLst>
+            <a:ext uri="{91240B29-F687-4F45-9708-019B960494DF}">
+              <a14:hiddenLine xmlns:a14="http://schemas.microsoft.com/office/drawing/2010/main" w="19050" algn="ctr">
+                <a:solidFill>
+                  <a:schemeClr val="tx2"/>
+                </a:solidFill>
+                <a:miter lim="800000"/>
+                <a:headEnd/>
+                <a:tailEnd/>
+              </a14:hiddenLine>
+            </a:ext>
+            <a:ext uri="{AF507438-7753-43E0-B8FC-AC1667EBCBE1}">
+              <a14:hiddenEffects xmlns:a14="http://schemas.microsoft.com/office/drawing/2010/main">
+                <a:effectLst>
+                  <a:outerShdw dist="35921" dir="2700000" algn="ctr" rotWithShape="0">
+                    <a:schemeClr val="bg2"/>
+                  </a:outerShdw>
+                </a:effectLst>
+              </a14:hiddenEffects>
+            </a:ext>
+          </a:extLst>
+        </p:spPr>
+        <p:txBody>
+          <a:bodyPr lIns="0" tIns="0" rIns="0" bIns="0" anchor="ctr"/>
+          <a:lstStyle>
+            <a:lvl1pPr marL="376238" algn="l">
+              <a:defRPr sz="2400">
+                <a:solidFill>
+                  <a:schemeClr val="tx1"/>
+                </a:solidFill>
+                <a:latin typeface="Arial" charset="0"/>
+              </a:defRPr>
+            </a:lvl1pPr>
+            <a:lvl2pPr marL="566738" algn="l">
+              <a:defRPr sz="2400">
+                <a:solidFill>
+                  <a:schemeClr val="tx1"/>
+                </a:solidFill>
+                <a:latin typeface="Arial" charset="0"/>
+              </a:defRPr>
+            </a:lvl2pPr>
+            <a:lvl3pPr algn="l">
+              <a:defRPr sz="2400">
+                <a:solidFill>
+                  <a:schemeClr val="tx1"/>
+                </a:solidFill>
+                <a:latin typeface="Arial" charset="0"/>
+              </a:defRPr>
+            </a:lvl3pPr>
+            <a:lvl4pPr algn="l">
+              <a:defRPr sz="2400">
+                <a:solidFill>
+                  <a:schemeClr val="tx1"/>
+                </a:solidFill>
+                <a:latin typeface="Arial" charset="0"/>
+              </a:defRPr>
+            </a:lvl4pPr>
+            <a:lvl5pPr algn="l">
+              <a:defRPr sz="2400">
+                <a:solidFill>
+                  <a:schemeClr val="tx1"/>
+                </a:solidFill>
+                <a:latin typeface="Arial" charset="0"/>
+              </a:defRPr>
+            </a:lvl5pPr>
+            <a:lvl6pPr eaLnBrk="0" fontAlgn="base" hangingPunct="0">
+              <a:spcBef>
+                <a:spcPct val="0"/>
+              </a:spcBef>
+              <a:spcAft>
+                <a:spcPct val="0"/>
+              </a:spcAft>
+              <a:defRPr sz="2400">
+                <a:solidFill>
+                  <a:schemeClr val="tx1"/>
+                </a:solidFill>
+                <a:latin typeface="Arial" charset="0"/>
+              </a:defRPr>
+            </a:lvl6pPr>
+            <a:lvl7pPr eaLnBrk="0" fontAlgn="base" hangingPunct="0">
+              <a:spcBef>
+                <a:spcPct val="0"/>
+              </a:spcBef>
+              <a:spcAft>
+                <a:spcPct val="0"/>
+              </a:spcAft>
+              <a:defRPr sz="2400">
+                <a:solidFill>
+                  <a:schemeClr val="tx1"/>
+                </a:solidFill>
+                <a:latin typeface="Arial" charset="0"/>
+              </a:defRPr>
+            </a:lvl7pPr>
+            <a:lvl8pPr eaLnBrk="0" fontAlgn="base" hangingPunct="0">
+              <a:spcBef>
+                <a:spcPct val="0"/>
+              </a:spcBef>
+              <a:spcAft>
+                <a:spcPct val="0"/>
+              </a:spcAft>
+              <a:defRPr sz="2400">
+                <a:solidFill>
+                  <a:schemeClr val="tx1"/>
+                </a:solidFill>
+                <a:latin typeface="Arial" charset="0"/>
+              </a:defRPr>
+            </a:lvl8pPr>
+            <a:lvl9pPr eaLnBrk="0" fontAlgn="base" hangingPunct="0">
+              <a:spcBef>
+                <a:spcPct val="0"/>
+              </a:spcBef>
+              <a:spcAft>
+                <a:spcPct val="0"/>
+              </a:spcAft>
+              <a:defRPr sz="2400">
+                <a:solidFill>
+                  <a:schemeClr val="tx1"/>
+                </a:solidFill>
+                <a:latin typeface="Arial" charset="0"/>
+              </a:defRPr>
+            </a:lvl9pPr>
+          </a:lstStyle>
+          <a:p>
+            <a:pPr eaLnBrk="1" hangingPunct="1">
+              <a:spcBef>
+                <a:spcPct val="30000"/>
+              </a:spcBef>
+            </a:pPr>
+            <a:r>
+              <a:rPr lang="de-DE" altLang="de-DE" sz="1300" b="1" dirty="0">
+                <a:solidFill>
+                  <a:srgbClr val="000000"/>
+                </a:solidFill>
+              </a:rPr>
+              <a:t>BILD</a:t>
+            </a:r>
+          </a:p>
+          <a:p>
+            <a:pPr eaLnBrk="1" hangingPunct="1">
+              <a:spcBef>
+                <a:spcPct val="30000"/>
+              </a:spcBef>
+            </a:pPr>
+            <a:r>
+              <a:rPr lang="de-DE" altLang="de-DE" sz="1300" dirty="0">
+                <a:solidFill>
+                  <a:srgbClr val="000000"/>
+                </a:solidFill>
+              </a:rPr>
+              <a:t>Positionierungsfläche für Bilder.</a:t>
+            </a:r>
+          </a:p>
+          <a:p>
+            <a:pPr eaLnBrk="1" hangingPunct="1">
+              <a:spcBef>
+                <a:spcPct val="30000"/>
+              </a:spcBef>
+            </a:pPr>
+            <a:r>
+              <a:rPr lang="de-DE" altLang="de-DE" sz="1300" dirty="0">
+                <a:solidFill>
+                  <a:srgbClr val="000000"/>
+                </a:solidFill>
+              </a:rPr>
+              <a:t>Bitte in linker oberer Ecke beginnen.</a:t>
+            </a:r>
+          </a:p>
+          <a:p>
+            <a:pPr eaLnBrk="1" hangingPunct="1">
+              <a:spcBef>
+                <a:spcPct val="30000"/>
+              </a:spcBef>
+            </a:pPr>
+            <a:r>
+              <a:rPr lang="de-DE" altLang="de-DE" sz="1300" dirty="0">
+                <a:solidFill>
+                  <a:srgbClr val="000000"/>
+                </a:solidFill>
+              </a:rPr>
+              <a:t>Bis maximal rechte und/oder untere Begrenzung, ggf. Bild beschneiden.</a:t>
+            </a:r>
+          </a:p>
+          <a:p>
+            <a:pPr eaLnBrk="1" hangingPunct="1">
+              <a:spcBef>
+                <a:spcPct val="30000"/>
+              </a:spcBef>
+            </a:pPr>
+            <a:endParaRPr lang="de-DE" altLang="de-DE" sz="1300" dirty="0">
+              <a:solidFill>
+                <a:srgbClr val="000000"/>
+              </a:solidFill>
+            </a:endParaRPr>
+          </a:p>
+        </p:txBody>
+      </p:sp>
+      <p:sp>
+        <p:nvSpPr>
+          <p:cNvPr id="2" name="Fußzeilenplatzhalter 1"/>
+          <p:cNvSpPr>
+            <a:spLocks noGrp="1"/>
+          </p:cNvSpPr>
+          <p:nvPr>
+            <p:ph type="ftr" sz="quarter" idx="10"/>
+          </p:nvPr>
+        </p:nvSpPr>
+        <p:spPr/>
+        <p:txBody>
+          <a:bodyPr/>
+          <a:lstStyle/>
+          <a:p>
+            <a:r>
+              <a:rPr lang="en-US" altLang="de-DE"/>
+              <a:t>SIP2 Zwischenpräsentation | Uschakow | Alhanoun | Skiadas</a:t>
+            </a:r>
+            <a:endParaRPr lang="de-DE" altLang="de-DE" dirty="0"/>
+          </a:p>
+        </p:txBody>
+      </p:sp>
+      <p:sp>
+        <p:nvSpPr>
+          <p:cNvPr id="10" name="Foliennummernplatzhalter 9"/>
+          <p:cNvSpPr>
+            <a:spLocks noGrp="1"/>
+          </p:cNvSpPr>
+          <p:nvPr>
+            <p:ph type="sldNum" sz="quarter" idx="11"/>
+          </p:nvPr>
+        </p:nvSpPr>
+        <p:spPr/>
+        <p:txBody>
+          <a:bodyPr/>
+          <a:lstStyle/>
+          <a:p>
+            <a:fld id="{57D12BB6-0ED4-46B6-AB23-7758AD07EFBF}" type="slidenum">
+              <a:rPr lang="de-DE" smtClean="0"/>
+              <a:pPr/>
+              <a:t>12</a:t>
+            </a:fld>
+            <a:endParaRPr lang="de-DE" dirty="0"/>
+          </a:p>
+        </p:txBody>
+      </p:sp>
+    </p:spTree>
+    <p:extLst>
+      <p:ext uri="{BB962C8B-B14F-4D97-AF65-F5344CB8AC3E}">
+        <p14:creationId xmlns:p14="http://schemas.microsoft.com/office/powerpoint/2010/main" val="1276860995"/>
+      </p:ext>
+    </p:extLst>
+  </p:cSld>
+  <p:clrMapOvr>
+    <a:masterClrMapping/>
+  </p:clrMapOvr>
+  <p:transition/>
+</p:sld>
+</file>
+
+<file path=ppt/slides/slide13.xml><?xml version="1.0" encoding="utf-8"?>
+<p:sld xmlns:a="http://schemas.openxmlformats.org/drawingml/2006/main" xmlns:r="http://schemas.openxmlformats.org/officeDocument/2006/relationships" xmlns:p="http://schemas.openxmlformats.org/presentationml/2006/main">
+  <p:cSld>
+    <p:spTree>
+      <p:nvGrpSpPr>
+        <p:cNvPr id="1" name=""/>
+        <p:cNvGrpSpPr/>
+        <p:nvPr/>
+      </p:nvGrpSpPr>
+      <p:grpSpPr>
+        <a:xfrm>
+          <a:off x="0" y="0"/>
+          <a:ext cx="0" cy="0"/>
+          <a:chOff x="0" y="0"/>
+          <a:chExt cx="0" cy="0"/>
+        </a:xfrm>
+      </p:grpSpPr>
+      <p:sp>
+        <p:nvSpPr>
+          <p:cNvPr id="5" name="Rectangle 2"/>
+          <p:cNvSpPr>
+            <a:spLocks noGrp="1" noChangeArrowheads="1"/>
+          </p:cNvSpPr>
+          <p:nvPr>
+            <p:ph type="title"/>
+          </p:nvPr>
+        </p:nvSpPr>
+        <p:spPr>
+          <a:xfrm>
+            <a:off x="971550" y="1404000"/>
             <a:ext cx="7704138" cy="792162"/>
           </a:xfrm>
         </p:spPr>
@@ -6214,7 +6640,7 @@
             <a:fld id="{57D12BB6-0ED4-46B6-AB23-7758AD07EFBF}" type="slidenum">
               <a:rPr lang="de-DE" smtClean="0"/>
               <a:pPr/>
-              <a:t>12</a:t>
+              <a:t>13</a:t>
             </a:fld>
             <a:endParaRPr lang="de-DE" dirty="0"/>
           </a:p>
@@ -6234,7 +6660,7 @@
 </p:sld>
 </file>
 
-<file path=ppt/slides/slide13.xml><?xml version="1.0" encoding="utf-8"?>
+<file path=ppt/slides/slide14.xml><?xml version="1.0" encoding="utf-8"?>
 <p:sld xmlns:a="http://schemas.openxmlformats.org/drawingml/2006/main" xmlns:r="http://schemas.openxmlformats.org/officeDocument/2006/relationships" xmlns:p="http://schemas.openxmlformats.org/presentationml/2006/main">
   <p:cSld>
     <p:spTree>
@@ -6337,7 +6763,7 @@
             <a:fld id="{57D12BB6-0ED4-46B6-AB23-7758AD07EFBF}" type="slidenum">
               <a:rPr lang="de-DE" smtClean="0"/>
               <a:pPr/>
-              <a:t>13</a:t>
+              <a:t>14</a:t>
             </a:fld>
             <a:endParaRPr lang="de-DE" dirty="0"/>
           </a:p>
@@ -6357,7 +6783,7 @@
 </p:sld>
 </file>
 
-<file path=ppt/slides/slide14.xml><?xml version="1.0" encoding="utf-8"?>
+<file path=ppt/slides/slide15.xml><?xml version="1.0" encoding="utf-8"?>
 <p:sld xmlns:a="http://schemas.openxmlformats.org/drawingml/2006/main" xmlns:r="http://schemas.openxmlformats.org/officeDocument/2006/relationships" xmlns:p="http://schemas.openxmlformats.org/presentationml/2006/main">
   <p:cSld>
     <p:spTree>
@@ -6466,7 +6892,7 @@
             <a:fld id="{57D12BB6-0ED4-46B6-AB23-7758AD07EFBF}" type="slidenum">
               <a:rPr lang="de-DE" smtClean="0"/>
               <a:pPr/>
-              <a:t>14</a:t>
+              <a:t>15</a:t>
             </a:fld>
             <a:endParaRPr lang="de-DE" dirty="0"/>
           </a:p>
@@ -6486,7 +6912,7 @@
 </p:sld>
 </file>
 
-<file path=ppt/slides/slide15.xml><?xml version="1.0" encoding="utf-8"?>
+<file path=ppt/slides/slide16.xml><?xml version="1.0" encoding="utf-8"?>
 <p:sld xmlns:a="http://schemas.openxmlformats.org/drawingml/2006/main" xmlns:r="http://schemas.openxmlformats.org/officeDocument/2006/relationships" xmlns:p="http://schemas.openxmlformats.org/presentationml/2006/main">
   <p:cSld>
     <p:spTree>
@@ -11118,7 +11544,7 @@
             <a:fld id="{57D12BB6-0ED4-46B6-AB23-7758AD07EFBF}" type="slidenum">
               <a:rPr lang="de-DE" smtClean="0"/>
               <a:pPr/>
-              <a:t>15</a:t>
+              <a:t>16</a:t>
             </a:fld>
             <a:endParaRPr lang="de-DE" dirty="0"/>
           </a:p>
@@ -11138,7 +11564,7 @@
 </p:sld>
 </file>
 
-<file path=ppt/slides/slide16.xml><?xml version="1.0" encoding="utf-8"?>
+<file path=ppt/slides/slide17.xml><?xml version="1.0" encoding="utf-8"?>
 <p:sld xmlns:a="http://schemas.openxmlformats.org/drawingml/2006/main" xmlns:r="http://schemas.openxmlformats.org/officeDocument/2006/relationships" xmlns:p="http://schemas.openxmlformats.org/presentationml/2006/main">
   <p:cSld>
     <p:spTree>
@@ -12391,7 +12817,7 @@
             <a:fld id="{57D12BB6-0ED4-46B6-AB23-7758AD07EFBF}" type="slidenum">
               <a:rPr lang="de-DE" smtClean="0"/>
               <a:pPr/>
-              <a:t>16</a:t>
+              <a:t>17</a:t>
             </a:fld>
             <a:endParaRPr lang="de-DE" dirty="0"/>
           </a:p>
@@ -12411,7 +12837,7 @@
 </p:sld>
 </file>
 
-<file path=ppt/slides/slide17.xml><?xml version="1.0" encoding="utf-8"?>
+<file path=ppt/slides/slide18.xml><?xml version="1.0" encoding="utf-8"?>
 <p:sld xmlns:a="http://schemas.openxmlformats.org/drawingml/2006/main" xmlns:r="http://schemas.openxmlformats.org/officeDocument/2006/relationships" xmlns:p="http://schemas.openxmlformats.org/presentationml/2006/main">
   <p:cSld>
     <p:spTree>
@@ -14261,7 +14687,7 @@
             <a:fld id="{57D12BB6-0ED4-46B6-AB23-7758AD07EFBF}" type="slidenum">
               <a:rPr lang="de-DE" smtClean="0"/>
               <a:pPr/>
-              <a:t>17</a:t>
+              <a:t>18</a:t>
             </a:fld>
             <a:endParaRPr lang="de-DE" dirty="0"/>
           </a:p>
@@ -14281,7 +14707,7 @@
 </p:sld>
 </file>
 
-<file path=ppt/slides/slide18.xml><?xml version="1.0" encoding="utf-8"?>
+<file path=ppt/slides/slide19.xml><?xml version="1.0" encoding="utf-8"?>
 <p:sld xmlns:a="http://schemas.openxmlformats.org/drawingml/2006/main" xmlns:r="http://schemas.openxmlformats.org/officeDocument/2006/relationships" xmlns:p="http://schemas.openxmlformats.org/presentationml/2006/main">
   <p:cSld>
     <p:spTree>
@@ -17923,7 +18349,7 @@
             <a:fld id="{57D12BB6-0ED4-46B6-AB23-7758AD07EFBF}" type="slidenum">
               <a:rPr lang="de-DE" smtClean="0"/>
               <a:pPr/>
-              <a:t>18</a:t>
+              <a:t>19</a:t>
             </a:fld>
             <a:endParaRPr lang="de-DE" dirty="0"/>
           </a:p>
@@ -18205,12 +18631,8 @@
               <a:buAutoNum type="arabicPeriod" startAt="2"/>
             </a:pPr>
             <a:r>
-              <a:rPr lang="en-US" altLang="de-DE" kern="0" dirty="0"/>
-              <a:t>M</a:t>
-            </a:r>
-            <a:r>
               <a:rPr lang="de-DE" altLang="de-DE" kern="0" dirty="0"/>
-              <a:t>atlab2Android</a:t>
+              <a:t>Modulbeschreibung</a:t>
             </a:r>
           </a:p>
           <a:p>
@@ -18219,8 +18641,12 @@
               <a:buAutoNum type="arabicPeriod" startAt="2"/>
             </a:pPr>
             <a:r>
-              <a:rPr lang="de-DE" altLang="de-DE" kern="0" dirty="0"/>
-              <a:t>Modulbeschreibung</a:t>
+              <a:rPr lang="en-US" altLang="de-DE" kern="0" dirty="0"/>
+              <a:t>M</a:t>
+            </a:r>
+            <a:r>
+              <a:rPr lang="de-DE" altLang="de-DE" kern="0"/>
+              <a:t>atlab2Android</a:t>
             </a:r>
           </a:p>
           <a:p>
@@ -18929,7 +19355,7 @@
             <a:pPr lvl="1"/>
             <a:r>
               <a:rPr lang="de-DE" altLang="de-DE" kern="0" dirty="0"/>
-              <a:t>Ziel: Generieren die </a:t>
+              <a:t>Ziel: Generierung der </a:t>
             </a:r>
             <a:r>
               <a:rPr lang="de-DE" altLang="de-DE" kern="0" dirty="0" err="1"/>
@@ -18965,7 +19391,7 @@
             <a:pPr lvl="1"/>
             <a:r>
               <a:rPr lang="de-DE" altLang="de-DE" kern="0" dirty="0"/>
-              <a:t> Fensterung der EKG Daten und Generieren</a:t>
+              <a:t>Fensterung der EKG Daten und Generierung</a:t>
             </a:r>
           </a:p>
           <a:p>
@@ -19148,7 +19574,7 @@
           <p:nvPr/>
         </p:nvPicPr>
         <p:blipFill>
-          <a:blip r:embed="rId2">
+          <a:blip r:embed="rId2" cstate="print">
             <a:extLst>
               <a:ext uri="{28A0092B-C50C-407E-A947-70E740481C1C}">
                 <a14:useLocalDpi xmlns:a14="http://schemas.microsoft.com/office/drawing/2010/main" val="0"/>
@@ -19161,8 +19587,8 @@
         </p:blipFill>
         <p:spPr>
           <a:xfrm>
-            <a:off x="4715632" y="4075957"/>
-            <a:ext cx="4428368" cy="1882282"/>
+            <a:off x="4946039" y="4062853"/>
+            <a:ext cx="3729649" cy="1585291"/>
           </a:xfrm>
           <a:prstGeom prst="rect">
             <a:avLst/>
@@ -19359,7 +19785,7 @@
               <a:rPr lang="de-DE" altLang="de-DE" kern="0" dirty="0">
                 <a:sym typeface="Wingdings" panose="05000000000000000000" pitchFamily="2" charset="2"/>
               </a:rPr>
-              <a:t>1. Nebenmaximal zu erhalten</a:t>
+              <a:t>     1. Nebenmaximal zu erhalten</a:t>
             </a:r>
           </a:p>
           <a:p>
@@ -19380,7 +19806,7 @@
               <a:rPr lang="de-DE" altLang="de-DE" kern="0" dirty="0">
                 <a:sym typeface="Wingdings" panose="05000000000000000000" pitchFamily="2" charset="2"/>
               </a:rPr>
-              <a:t> AKF-Fenster</a:t>
+              <a:t>     AKF-Fenster</a:t>
             </a:r>
           </a:p>
           <a:p>
@@ -19404,7 +19830,7 @@
               <a:rPr lang="de-DE" altLang="de-DE" kern="0" dirty="0">
                 <a:sym typeface="Wingdings" panose="05000000000000000000" pitchFamily="2" charset="2"/>
               </a:rPr>
-              <a:t>Generierung einer 1 x 26 Matrix zum Training des NN</a:t>
+              <a:t>Generierung eines 1 x 26 Vektors zum Training des NN</a:t>
             </a:r>
             <a:endParaRPr lang="de-DE" altLang="de-DE" kern="0" dirty="0"/>
           </a:p>
@@ -19438,8 +19864,8 @@
         </p:blipFill>
         <p:spPr>
           <a:xfrm>
-            <a:off x="6573304" y="2167593"/>
-            <a:ext cx="2463192" cy="1843294"/>
+            <a:off x="6644496" y="2167593"/>
+            <a:ext cx="2031144" cy="1519977"/>
           </a:xfrm>
           <a:prstGeom prst="rect">
             <a:avLst/>
@@ -19499,7 +19925,7 @@
           <a:p>
             <a:r>
               <a:rPr lang="de-DE" altLang="de-DE" dirty="0"/>
-              <a:t>4. Modulbeschreibung</a:t>
+              <a:t>3. Modulbeschreibung</a:t>
             </a:r>
           </a:p>
         </p:txBody>
@@ -19731,8 +20157,13 @@
             </a:r>
             <a:r>
               <a:rPr lang="en-US" altLang="de-DE" kern="0" dirty="0"/>
-              <a:t> des Histograms</a:t>
-            </a:r>
+              <a:t> des </a:t>
+            </a:r>
+            <a:r>
+              <a:rPr lang="en-US" altLang="de-DE" kern="0" dirty="0" err="1"/>
+              <a:t>Histogramms</a:t>
+            </a:r>
+            <a:endParaRPr lang="en-US" altLang="de-DE" kern="0" dirty="0"/>
           </a:p>
           <a:p>
             <a:pPr lvl="3"/>
@@ -19742,7 +20173,7 @@
             </a:r>
             <a:r>
               <a:rPr lang="en-US" altLang="de-DE" kern="0" dirty="0"/>
-              <a:t> der features</a:t>
+              <a:t> der Features</a:t>
             </a:r>
           </a:p>
           <a:p>
@@ -19816,7 +20247,7 @@
             </a:r>
             <a:r>
               <a:rPr lang="en-US" altLang="de-DE" kern="0" dirty="0"/>
-              <a:t> </a:t>
+              <a:t>, </a:t>
             </a:r>
             <a:r>
               <a:rPr lang="en-US" altLang="de-DE" kern="0" dirty="0" err="1"/>
@@ -19935,7 +20366,7 @@
           <a:p>
             <a:r>
               <a:rPr lang="de-DE" altLang="de-DE" dirty="0"/>
-              <a:t>4. Modulbeschreibung</a:t>
+              <a:t>3. Modulbeschreibung</a:t>
             </a:r>
           </a:p>
         </p:txBody>
@@ -20790,7 +21221,7 @@
           <a:p>
             <a:r>
               <a:rPr lang="de-DE" altLang="de-DE" dirty="0"/>
-              <a:t>4. Modulbeschreibung</a:t>
+              <a:t>3. Modulbeschreibung</a:t>
             </a:r>
           </a:p>
         </p:txBody>
@@ -21294,7 +21725,7 @@
           <a:p>
             <a:r>
               <a:rPr lang="de-DE" altLang="de-DE" dirty="0"/>
-              <a:t>5. Ausblick</a:t>
+              <a:t>4. Matlab2Android</a:t>
             </a:r>
           </a:p>
         </p:txBody>
@@ -21493,31 +21924,12 @@
           </a:lstStyle>
           <a:p>
             <a:pPr lvl="1"/>
-            <a:r>
-              <a:rPr lang="de-DE" altLang="de-DE" kern="0" dirty="0"/>
-              <a:t>Erstellung von C++ Code</a:t>
-            </a:r>
-          </a:p>
-          <a:p>
-            <a:pPr lvl="1"/>
-            <a:r>
-              <a:rPr lang="de-DE" altLang="de-DE" kern="0" dirty="0"/>
-              <a:t>Kompilierung </a:t>
-            </a:r>
-          </a:p>
-          <a:p>
-            <a:pPr lvl="1"/>
-            <a:r>
-              <a:rPr lang="de-DE" altLang="de-DE" kern="0" dirty="0"/>
-              <a:t>Fertigstellung des Android Moduls</a:t>
-            </a:r>
-          </a:p>
-          <a:p>
-            <a:pPr lvl="1"/>
             <a:endParaRPr lang="de-DE" altLang="de-DE" kern="0" dirty="0"/>
           </a:p>
           <a:p>
-            <a:pPr lvl="1"/>
+            <a:pPr marL="1588" lvl="1" indent="0">
+              <a:buNone/>
+            </a:pPr>
             <a:endParaRPr lang="de-DE" altLang="de-DE" kern="0" dirty="0"/>
           </a:p>
         </p:txBody>
@@ -21572,7 +21984,7 @@
     </p:spTree>
     <p:extLst>
       <p:ext uri="{BB962C8B-B14F-4D97-AF65-F5344CB8AC3E}">
-        <p14:creationId xmlns:p14="http://schemas.microsoft.com/office/powerpoint/2010/main" val="1080710209"/>
+        <p14:creationId xmlns:p14="http://schemas.microsoft.com/office/powerpoint/2010/main" val="1175694138"/>
       </p:ext>
     </p:extLst>
   </p:cSld>

</xml_diff>